<commit_message>
Brought the powerpoint overview doc up to date
</commit_message>
<xml_diff>
--- a/data-raw/package_functionalities.pptx
+++ b/data-raw/package_functionalities.pptx
@@ -244,7 +244,7 @@
           <a:p>
             <a:fld id="{FC92A4BB-39BE-403C-A496-EAAF42256EA7}" type="datetimeFigureOut">
               <a:rPr lang="en-SG" smtClean="0"/>
-              <a:t>16/1/2019</a:t>
+              <a:t>18/1/2019</a:t>
             </a:fld>
             <a:endParaRPr lang="en-SG"/>
           </a:p>
@@ -409,7 +409,7 @@
           <a:p>
             <a:fld id="{FC92A4BB-39BE-403C-A496-EAAF42256EA7}" type="datetimeFigureOut">
               <a:rPr lang="en-SG" smtClean="0"/>
-              <a:t>16/1/2019</a:t>
+              <a:t>18/1/2019</a:t>
             </a:fld>
             <a:endParaRPr lang="en-SG"/>
           </a:p>
@@ -584,7 +584,7 @@
           <a:p>
             <a:fld id="{FC92A4BB-39BE-403C-A496-EAAF42256EA7}" type="datetimeFigureOut">
               <a:rPr lang="en-SG" smtClean="0"/>
-              <a:t>16/1/2019</a:t>
+              <a:t>18/1/2019</a:t>
             </a:fld>
             <a:endParaRPr lang="en-SG"/>
           </a:p>
@@ -749,7 +749,7 @@
           <a:p>
             <a:fld id="{FC92A4BB-39BE-403C-A496-EAAF42256EA7}" type="datetimeFigureOut">
               <a:rPr lang="en-SG" smtClean="0"/>
-              <a:t>16/1/2019</a:t>
+              <a:t>18/1/2019</a:t>
             </a:fld>
             <a:endParaRPr lang="en-SG"/>
           </a:p>
@@ -990,7 +990,7 @@
           <a:p>
             <a:fld id="{FC92A4BB-39BE-403C-A496-EAAF42256EA7}" type="datetimeFigureOut">
               <a:rPr lang="en-SG" smtClean="0"/>
-              <a:t>16/1/2019</a:t>
+              <a:t>18/1/2019</a:t>
             </a:fld>
             <a:endParaRPr lang="en-SG"/>
           </a:p>
@@ -1217,7 +1217,7 @@
           <a:p>
             <a:fld id="{FC92A4BB-39BE-403C-A496-EAAF42256EA7}" type="datetimeFigureOut">
               <a:rPr lang="en-SG" smtClean="0"/>
-              <a:t>16/1/2019</a:t>
+              <a:t>18/1/2019</a:t>
             </a:fld>
             <a:endParaRPr lang="en-SG"/>
           </a:p>
@@ -1579,7 +1579,7 @@
           <a:p>
             <a:fld id="{FC92A4BB-39BE-403C-A496-EAAF42256EA7}" type="datetimeFigureOut">
               <a:rPr lang="en-SG" smtClean="0"/>
-              <a:t>16/1/2019</a:t>
+              <a:t>18/1/2019</a:t>
             </a:fld>
             <a:endParaRPr lang="en-SG"/>
           </a:p>
@@ -1692,7 +1692,7 @@
           <a:p>
             <a:fld id="{FC92A4BB-39BE-403C-A496-EAAF42256EA7}" type="datetimeFigureOut">
               <a:rPr lang="en-SG" smtClean="0"/>
-              <a:t>16/1/2019</a:t>
+              <a:t>18/1/2019</a:t>
             </a:fld>
             <a:endParaRPr lang="en-SG"/>
           </a:p>
@@ -1782,7 +1782,7 @@
           <a:p>
             <a:fld id="{FC92A4BB-39BE-403C-A496-EAAF42256EA7}" type="datetimeFigureOut">
               <a:rPr lang="en-SG" smtClean="0"/>
-              <a:t>16/1/2019</a:t>
+              <a:t>18/1/2019</a:t>
             </a:fld>
             <a:endParaRPr lang="en-SG"/>
           </a:p>
@@ -2054,7 +2054,7 @@
           <a:p>
             <a:fld id="{FC92A4BB-39BE-403C-A496-EAAF42256EA7}" type="datetimeFigureOut">
               <a:rPr lang="en-SG" smtClean="0"/>
-              <a:t>16/1/2019</a:t>
+              <a:t>18/1/2019</a:t>
             </a:fld>
             <a:endParaRPr lang="en-SG"/>
           </a:p>
@@ -2302,7 +2302,7 @@
           <a:p>
             <a:fld id="{FC92A4BB-39BE-403C-A496-EAAF42256EA7}" type="datetimeFigureOut">
               <a:rPr lang="en-SG" smtClean="0"/>
-              <a:t>16/1/2019</a:t>
+              <a:t>18/1/2019</a:t>
             </a:fld>
             <a:endParaRPr lang="en-SG"/>
           </a:p>
@@ -2510,7 +2510,7 @@
           <a:p>
             <a:fld id="{FC92A4BB-39BE-403C-A496-EAAF42256EA7}" type="datetimeFigureOut">
               <a:rPr lang="en-SG" smtClean="0"/>
-              <a:t>16/1/2019</a:t>
+              <a:t>18/1/2019</a:t>
             </a:fld>
             <a:endParaRPr lang="en-SG"/>
           </a:p>
@@ -2932,14 +2932,14 @@
       </p:sp>
       <p:sp>
         <p:nvSpPr>
-          <p:cNvPr id="20" name="Freeform 19"/>
+          <p:cNvPr id="40" name="Freeform 39"/>
           <p:cNvSpPr/>
           <p:nvPr/>
         </p:nvSpPr>
         <p:spPr>
           <a:xfrm>
-            <a:off x="8329607" y="4832164"/>
-            <a:ext cx="139249" cy="1086146"/>
+            <a:off x="4162102" y="3506401"/>
+            <a:ext cx="91440" cy="194949"/>
           </a:xfrm>
           <a:custGeom>
             <a:avLst/>
@@ -2950,13 +2950,10 @@
             <a:pathLst>
               <a:path>
                 <a:moveTo>
-                  <a:pt x="0" y="0"/>
+                  <a:pt x="45720" y="0"/>
                 </a:moveTo>
                 <a:lnTo>
-                  <a:pt x="0" y="1086146"/>
-                </a:lnTo>
-                <a:lnTo>
-                  <a:pt x="139249" y="1086146"/>
+                  <a:pt x="45720" y="194949"/>
                 </a:lnTo>
               </a:path>
             </a:pathLst>
@@ -2996,14 +2993,14 @@
       </p:sp>
       <p:sp>
         <p:nvSpPr>
-          <p:cNvPr id="21" name="Freeform 20"/>
+          <p:cNvPr id="46" name="Freeform 45"/>
           <p:cNvSpPr/>
           <p:nvPr/>
         </p:nvSpPr>
         <p:spPr>
           <a:xfrm>
-            <a:off x="8329607" y="4832164"/>
-            <a:ext cx="139249" cy="427031"/>
+            <a:off x="1399623" y="3506401"/>
+            <a:ext cx="561639" cy="194949"/>
           </a:xfrm>
           <a:custGeom>
             <a:avLst/>
@@ -3017,10 +3014,13 @@
                   <a:pt x="0" y="0"/>
                 </a:moveTo>
                 <a:lnTo>
-                  <a:pt x="0" y="427031"/>
-                </a:lnTo>
-                <a:lnTo>
-                  <a:pt x="139249" y="427031"/>
+                  <a:pt x="0" y="97474"/>
+                </a:lnTo>
+                <a:lnTo>
+                  <a:pt x="561639" y="97474"/>
+                </a:lnTo>
+                <a:lnTo>
+                  <a:pt x="561639" y="194949"/>
                 </a:lnTo>
               </a:path>
             </a:pathLst>
@@ -3060,14 +3060,14 @@
       </p:sp>
       <p:sp>
         <p:nvSpPr>
-          <p:cNvPr id="22" name="Freeform 21"/>
+          <p:cNvPr id="48" name="Freeform 47"/>
           <p:cNvSpPr/>
           <p:nvPr/>
         </p:nvSpPr>
         <p:spPr>
           <a:xfrm>
-            <a:off x="8866928" y="4119004"/>
-            <a:ext cx="91440" cy="194949"/>
+            <a:off x="837984" y="3506401"/>
+            <a:ext cx="561639" cy="194949"/>
           </a:xfrm>
           <a:custGeom>
             <a:avLst/>
@@ -3078,10 +3078,16 @@
             <a:pathLst>
               <a:path>
                 <a:moveTo>
-                  <a:pt x="45720" y="0"/>
+                  <a:pt x="561639" y="0"/>
                 </a:moveTo>
                 <a:lnTo>
-                  <a:pt x="45720" y="194949"/>
+                  <a:pt x="561639" y="97474"/>
+                </a:lnTo>
+                <a:lnTo>
+                  <a:pt x="0" y="97474"/>
+                </a:lnTo>
+                <a:lnTo>
+                  <a:pt x="0" y="194949"/>
                 </a:lnTo>
               </a:path>
             </a:pathLst>
@@ -3121,14 +3127,14 @@
       </p:sp>
       <p:sp>
         <p:nvSpPr>
-          <p:cNvPr id="24" name="Freeform 23"/>
+          <p:cNvPr id="49" name="Freeform 48"/>
           <p:cNvSpPr/>
           <p:nvPr/>
         </p:nvSpPr>
         <p:spPr>
           <a:xfrm>
-            <a:off x="7206328" y="4165515"/>
-            <a:ext cx="139249" cy="1745260"/>
+            <a:off x="1399623" y="2847287"/>
+            <a:ext cx="1965738" cy="194949"/>
           </a:xfrm>
           <a:custGeom>
             <a:avLst/>
@@ -3139,13 +3145,16 @@
             <a:pathLst>
               <a:path>
                 <a:moveTo>
-                  <a:pt x="0" y="0"/>
+                  <a:pt x="1965738" y="0"/>
                 </a:moveTo>
                 <a:lnTo>
-                  <a:pt x="0" y="1745260"/>
-                </a:lnTo>
-                <a:lnTo>
-                  <a:pt x="139249" y="1745260"/>
+                  <a:pt x="1965738" y="97474"/>
+                </a:lnTo>
+                <a:lnTo>
+                  <a:pt x="0" y="97474"/>
+                </a:lnTo>
+                <a:lnTo>
+                  <a:pt x="0" y="194949"/>
                 </a:lnTo>
               </a:path>
             </a:pathLst>
@@ -3185,972 +3194,6 @@
       </p:sp>
       <p:sp>
         <p:nvSpPr>
-          <p:cNvPr id="25" name="Freeform 24"/>
-          <p:cNvSpPr/>
-          <p:nvPr/>
-        </p:nvSpPr>
-        <p:spPr>
-          <a:xfrm>
-            <a:off x="7206328" y="4165515"/>
-            <a:ext cx="139249" cy="1086146"/>
-          </a:xfrm>
-          <a:custGeom>
-            <a:avLst/>
-            <a:gdLst/>
-            <a:ahLst/>
-            <a:cxnLst/>
-            <a:rect l="0" t="0" r="0" b="0"/>
-            <a:pathLst>
-              <a:path>
-                <a:moveTo>
-                  <a:pt x="0" y="0"/>
-                </a:moveTo>
-                <a:lnTo>
-                  <a:pt x="0" y="1086146"/>
-                </a:lnTo>
-                <a:lnTo>
-                  <a:pt x="139249" y="1086146"/>
-                </a:lnTo>
-              </a:path>
-            </a:pathLst>
-          </a:custGeom>
-          <a:noFill/>
-        </p:spPr>
-        <p:style>
-          <a:lnRef idx="2">
-            <a:schemeClr val="accent1">
-              <a:shade val="80000"/>
-              <a:hueOff val="0"/>
-              <a:satOff val="0"/>
-              <a:lumOff val="0"/>
-              <a:alphaOff val="0"/>
-            </a:schemeClr>
-          </a:lnRef>
-          <a:fillRef idx="0">
-            <a:scrgbClr r="0" g="0" b="0"/>
-          </a:fillRef>
-          <a:effectRef idx="0">
-            <a:schemeClr val="accent1">
-              <a:hueOff val="0"/>
-              <a:satOff val="0"/>
-              <a:lumOff val="0"/>
-              <a:alphaOff val="0"/>
-            </a:schemeClr>
-          </a:effectRef>
-          <a:fontRef idx="minor">
-            <a:schemeClr val="tx1">
-              <a:hueOff val="0"/>
-              <a:satOff val="0"/>
-              <a:lumOff val="0"/>
-              <a:alphaOff val="0"/>
-            </a:schemeClr>
-          </a:fontRef>
-        </p:style>
-      </p:sp>
-      <p:sp>
-        <p:nvSpPr>
-          <p:cNvPr id="26" name="Freeform 25"/>
-          <p:cNvSpPr/>
-          <p:nvPr/>
-        </p:nvSpPr>
-        <p:spPr>
-          <a:xfrm>
-            <a:off x="7206328" y="4165515"/>
-            <a:ext cx="139249" cy="427031"/>
-          </a:xfrm>
-          <a:custGeom>
-            <a:avLst/>
-            <a:gdLst/>
-            <a:ahLst/>
-            <a:cxnLst/>
-            <a:rect l="0" t="0" r="0" b="0"/>
-            <a:pathLst>
-              <a:path>
-                <a:moveTo>
-                  <a:pt x="0" y="0"/>
-                </a:moveTo>
-                <a:lnTo>
-                  <a:pt x="0" y="427031"/>
-                </a:lnTo>
-                <a:lnTo>
-                  <a:pt x="139249" y="427031"/>
-                </a:lnTo>
-              </a:path>
-            </a:pathLst>
-          </a:custGeom>
-          <a:noFill/>
-        </p:spPr>
-        <p:style>
-          <a:lnRef idx="2">
-            <a:schemeClr val="accent1">
-              <a:shade val="80000"/>
-              <a:hueOff val="0"/>
-              <a:satOff val="0"/>
-              <a:lumOff val="0"/>
-              <a:alphaOff val="0"/>
-            </a:schemeClr>
-          </a:lnRef>
-          <a:fillRef idx="0">
-            <a:scrgbClr r="0" g="0" b="0"/>
-          </a:fillRef>
-          <a:effectRef idx="0">
-            <a:schemeClr val="accent1">
-              <a:hueOff val="0"/>
-              <a:satOff val="0"/>
-              <a:lumOff val="0"/>
-              <a:alphaOff val="0"/>
-            </a:schemeClr>
-          </a:effectRef>
-          <a:fontRef idx="minor">
-            <a:schemeClr val="tx1">
-              <a:hueOff val="0"/>
-              <a:satOff val="0"/>
-              <a:lumOff val="0"/>
-              <a:alphaOff val="0"/>
-            </a:schemeClr>
-          </a:fontRef>
-        </p:style>
-      </p:sp>
-      <p:sp>
-        <p:nvSpPr>
-          <p:cNvPr id="28" name="Freeform 27"/>
-          <p:cNvSpPr/>
-          <p:nvPr/>
-        </p:nvSpPr>
-        <p:spPr>
-          <a:xfrm>
-            <a:off x="6083048" y="4165515"/>
-            <a:ext cx="139249" cy="427031"/>
-          </a:xfrm>
-          <a:custGeom>
-            <a:avLst/>
-            <a:gdLst/>
-            <a:ahLst/>
-            <a:cxnLst/>
-            <a:rect l="0" t="0" r="0" b="0"/>
-            <a:pathLst>
-              <a:path>
-                <a:moveTo>
-                  <a:pt x="0" y="0"/>
-                </a:moveTo>
-                <a:lnTo>
-                  <a:pt x="0" y="427031"/>
-                </a:lnTo>
-                <a:lnTo>
-                  <a:pt x="139249" y="427031"/>
-                </a:lnTo>
-              </a:path>
-            </a:pathLst>
-          </a:custGeom>
-          <a:noFill/>
-        </p:spPr>
-        <p:style>
-          <a:lnRef idx="2">
-            <a:schemeClr val="accent1">
-              <a:shade val="80000"/>
-              <a:hueOff val="0"/>
-              <a:satOff val="0"/>
-              <a:lumOff val="0"/>
-              <a:alphaOff val="0"/>
-            </a:schemeClr>
-          </a:lnRef>
-          <a:fillRef idx="0">
-            <a:scrgbClr r="0" g="0" b="0"/>
-          </a:fillRef>
-          <a:effectRef idx="0">
-            <a:schemeClr val="accent1">
-              <a:hueOff val="0"/>
-              <a:satOff val="0"/>
-              <a:lumOff val="0"/>
-              <a:alphaOff val="0"/>
-            </a:schemeClr>
-          </a:effectRef>
-          <a:fontRef idx="minor">
-            <a:schemeClr val="tx1">
-              <a:hueOff val="0"/>
-              <a:satOff val="0"/>
-              <a:lumOff val="0"/>
-              <a:alphaOff val="0"/>
-            </a:schemeClr>
-          </a:fontRef>
-        </p:style>
-      </p:sp>
-      <p:sp>
-        <p:nvSpPr>
-          <p:cNvPr id="33" name="Freeform 32"/>
-          <p:cNvSpPr/>
-          <p:nvPr/>
-        </p:nvSpPr>
-        <p:spPr>
-          <a:xfrm>
-            <a:off x="4959769" y="4165515"/>
-            <a:ext cx="139249" cy="427031"/>
-          </a:xfrm>
-          <a:custGeom>
-            <a:avLst/>
-            <a:gdLst/>
-            <a:ahLst/>
-            <a:cxnLst/>
-            <a:rect l="0" t="0" r="0" b="0"/>
-            <a:pathLst>
-              <a:path>
-                <a:moveTo>
-                  <a:pt x="0" y="0"/>
-                </a:moveTo>
-                <a:lnTo>
-                  <a:pt x="0" y="427031"/>
-                </a:lnTo>
-                <a:lnTo>
-                  <a:pt x="139249" y="427031"/>
-                </a:lnTo>
-              </a:path>
-            </a:pathLst>
-          </a:custGeom>
-          <a:noFill/>
-        </p:spPr>
-        <p:style>
-          <a:lnRef idx="2">
-            <a:schemeClr val="accent1">
-              <a:shade val="80000"/>
-              <a:hueOff val="0"/>
-              <a:satOff val="0"/>
-              <a:lumOff val="0"/>
-              <a:alphaOff val="0"/>
-            </a:schemeClr>
-          </a:lnRef>
-          <a:fillRef idx="0">
-            <a:scrgbClr r="0" g="0" b="0"/>
-          </a:fillRef>
-          <a:effectRef idx="0">
-            <a:schemeClr val="accent1">
-              <a:hueOff val="0"/>
-              <a:satOff val="0"/>
-              <a:lumOff val="0"/>
-              <a:alphaOff val="0"/>
-            </a:schemeClr>
-          </a:effectRef>
-          <a:fontRef idx="minor">
-            <a:schemeClr val="tx1">
-              <a:hueOff val="0"/>
-              <a:satOff val="0"/>
-              <a:lumOff val="0"/>
-              <a:alphaOff val="0"/>
-            </a:schemeClr>
-          </a:fontRef>
-        </p:style>
-      </p:sp>
-      <p:sp>
-        <p:nvSpPr>
-          <p:cNvPr id="36" name="Freeform 35"/>
-          <p:cNvSpPr/>
-          <p:nvPr/>
-        </p:nvSpPr>
-        <p:spPr>
-          <a:xfrm>
-            <a:off x="3836490" y="4165515"/>
-            <a:ext cx="1252094" cy="1941704"/>
-          </a:xfrm>
-          <a:custGeom>
-            <a:avLst/>
-            <a:gdLst/>
-            <a:ahLst/>
-            <a:cxnLst/>
-            <a:rect l="0" t="0" r="0" b="0"/>
-            <a:pathLst>
-              <a:path>
-                <a:moveTo>
-                  <a:pt x="0" y="0"/>
-                </a:moveTo>
-                <a:lnTo>
-                  <a:pt x="0" y="1941704"/>
-                </a:lnTo>
-                <a:lnTo>
-                  <a:pt x="1252094" y="1941704"/>
-                </a:lnTo>
-              </a:path>
-            </a:pathLst>
-          </a:custGeom>
-          <a:noFill/>
-        </p:spPr>
-        <p:style>
-          <a:lnRef idx="2">
-            <a:schemeClr val="accent1">
-              <a:shade val="80000"/>
-              <a:hueOff val="0"/>
-              <a:satOff val="0"/>
-              <a:lumOff val="0"/>
-              <a:alphaOff val="0"/>
-            </a:schemeClr>
-          </a:lnRef>
-          <a:fillRef idx="0">
-            <a:scrgbClr r="0" g="0" b="0"/>
-          </a:fillRef>
-          <a:effectRef idx="0">
-            <a:schemeClr val="accent1">
-              <a:hueOff val="0"/>
-              <a:satOff val="0"/>
-              <a:lumOff val="0"/>
-              <a:alphaOff val="0"/>
-            </a:schemeClr>
-          </a:effectRef>
-          <a:fontRef idx="minor">
-            <a:schemeClr val="tx1">
-              <a:hueOff val="0"/>
-              <a:satOff val="0"/>
-              <a:lumOff val="0"/>
-              <a:alphaOff val="0"/>
-            </a:schemeClr>
-          </a:fontRef>
-        </p:style>
-      </p:sp>
-      <p:sp>
-        <p:nvSpPr>
-          <p:cNvPr id="37" name="Freeform 36"/>
-          <p:cNvSpPr/>
-          <p:nvPr/>
-        </p:nvSpPr>
-        <p:spPr>
-          <a:xfrm>
-            <a:off x="3836490" y="4165515"/>
-            <a:ext cx="139249" cy="1941026"/>
-          </a:xfrm>
-          <a:custGeom>
-            <a:avLst/>
-            <a:gdLst/>
-            <a:ahLst/>
-            <a:cxnLst/>
-            <a:rect l="0" t="0" r="0" b="0"/>
-            <a:pathLst>
-              <a:path>
-                <a:moveTo>
-                  <a:pt x="0" y="0"/>
-                </a:moveTo>
-                <a:lnTo>
-                  <a:pt x="0" y="1941026"/>
-                </a:lnTo>
-                <a:lnTo>
-                  <a:pt x="139249" y="1941026"/>
-                </a:lnTo>
-              </a:path>
-            </a:pathLst>
-          </a:custGeom>
-          <a:noFill/>
-        </p:spPr>
-        <p:style>
-          <a:lnRef idx="2">
-            <a:schemeClr val="accent1">
-              <a:shade val="80000"/>
-              <a:hueOff val="0"/>
-              <a:satOff val="0"/>
-              <a:lumOff val="0"/>
-              <a:alphaOff val="0"/>
-            </a:schemeClr>
-          </a:lnRef>
-          <a:fillRef idx="0">
-            <a:scrgbClr r="0" g="0" b="0"/>
-          </a:fillRef>
-          <a:effectRef idx="0">
-            <a:schemeClr val="accent1">
-              <a:hueOff val="0"/>
-              <a:satOff val="0"/>
-              <a:lumOff val="0"/>
-              <a:alphaOff val="0"/>
-            </a:schemeClr>
-          </a:effectRef>
-          <a:fontRef idx="minor">
-            <a:schemeClr val="tx1">
-              <a:hueOff val="0"/>
-              <a:satOff val="0"/>
-              <a:lumOff val="0"/>
-              <a:alphaOff val="0"/>
-            </a:schemeClr>
-          </a:fontRef>
-        </p:style>
-      </p:sp>
-      <p:sp>
-        <p:nvSpPr>
-          <p:cNvPr id="38" name="Freeform 37"/>
-          <p:cNvSpPr/>
-          <p:nvPr/>
-        </p:nvSpPr>
-        <p:spPr>
-          <a:xfrm>
-            <a:off x="3836490" y="4165515"/>
-            <a:ext cx="139249" cy="1086146"/>
-          </a:xfrm>
-          <a:custGeom>
-            <a:avLst/>
-            <a:gdLst/>
-            <a:ahLst/>
-            <a:cxnLst/>
-            <a:rect l="0" t="0" r="0" b="0"/>
-            <a:pathLst>
-              <a:path>
-                <a:moveTo>
-                  <a:pt x="0" y="0"/>
-                </a:moveTo>
-                <a:lnTo>
-                  <a:pt x="0" y="1086146"/>
-                </a:lnTo>
-                <a:lnTo>
-                  <a:pt x="139249" y="1086146"/>
-                </a:lnTo>
-              </a:path>
-            </a:pathLst>
-          </a:custGeom>
-          <a:noFill/>
-        </p:spPr>
-        <p:style>
-          <a:lnRef idx="2">
-            <a:schemeClr val="accent1">
-              <a:shade val="80000"/>
-              <a:hueOff val="0"/>
-              <a:satOff val="0"/>
-              <a:lumOff val="0"/>
-              <a:alphaOff val="0"/>
-            </a:schemeClr>
-          </a:lnRef>
-          <a:fillRef idx="0">
-            <a:scrgbClr r="0" g="0" b="0"/>
-          </a:fillRef>
-          <a:effectRef idx="0">
-            <a:schemeClr val="accent1">
-              <a:hueOff val="0"/>
-              <a:satOff val="0"/>
-              <a:lumOff val="0"/>
-              <a:alphaOff val="0"/>
-            </a:schemeClr>
-          </a:effectRef>
-          <a:fontRef idx="minor">
-            <a:schemeClr val="tx1">
-              <a:hueOff val="0"/>
-              <a:satOff val="0"/>
-              <a:lumOff val="0"/>
-              <a:alphaOff val="0"/>
-            </a:schemeClr>
-          </a:fontRef>
-        </p:style>
-      </p:sp>
-      <p:sp>
-        <p:nvSpPr>
-          <p:cNvPr id="39" name="Freeform 38"/>
-          <p:cNvSpPr/>
-          <p:nvPr/>
-        </p:nvSpPr>
-        <p:spPr>
-          <a:xfrm>
-            <a:off x="3836490" y="4165515"/>
-            <a:ext cx="139249" cy="427031"/>
-          </a:xfrm>
-          <a:custGeom>
-            <a:avLst/>
-            <a:gdLst/>
-            <a:ahLst/>
-            <a:cxnLst/>
-            <a:rect l="0" t="0" r="0" b="0"/>
-            <a:pathLst>
-              <a:path>
-                <a:moveTo>
-                  <a:pt x="0" y="0"/>
-                </a:moveTo>
-                <a:lnTo>
-                  <a:pt x="0" y="427031"/>
-                </a:lnTo>
-                <a:lnTo>
-                  <a:pt x="139249" y="427031"/>
-                </a:lnTo>
-              </a:path>
-            </a:pathLst>
-          </a:custGeom>
-          <a:noFill/>
-        </p:spPr>
-        <p:style>
-          <a:lnRef idx="2">
-            <a:schemeClr val="accent1">
-              <a:shade val="80000"/>
-              <a:hueOff val="0"/>
-              <a:satOff val="0"/>
-              <a:lumOff val="0"/>
-              <a:alphaOff val="0"/>
-            </a:schemeClr>
-          </a:lnRef>
-          <a:fillRef idx="0">
-            <a:scrgbClr r="0" g="0" b="0"/>
-          </a:fillRef>
-          <a:effectRef idx="0">
-            <a:schemeClr val="accent1">
-              <a:hueOff val="0"/>
-              <a:satOff val="0"/>
-              <a:lumOff val="0"/>
-              <a:alphaOff val="0"/>
-            </a:schemeClr>
-          </a:effectRef>
-          <a:fontRef idx="minor">
-            <a:schemeClr val="tx1">
-              <a:hueOff val="0"/>
-              <a:satOff val="0"/>
-              <a:lumOff val="0"/>
-              <a:alphaOff val="0"/>
-            </a:schemeClr>
-          </a:fontRef>
-        </p:style>
-      </p:sp>
-      <p:sp>
-        <p:nvSpPr>
-          <p:cNvPr id="40" name="Freeform 39"/>
-          <p:cNvSpPr/>
-          <p:nvPr/>
-        </p:nvSpPr>
-        <p:spPr>
-          <a:xfrm>
-            <a:off x="4162102" y="3506401"/>
-            <a:ext cx="91440" cy="194949"/>
-          </a:xfrm>
-          <a:custGeom>
-            <a:avLst/>
-            <a:gdLst/>
-            <a:ahLst/>
-            <a:cxnLst/>
-            <a:rect l="0" t="0" r="0" b="0"/>
-            <a:pathLst>
-              <a:path>
-                <a:moveTo>
-                  <a:pt x="45720" y="0"/>
-                </a:moveTo>
-                <a:lnTo>
-                  <a:pt x="45720" y="194949"/>
-                </a:lnTo>
-              </a:path>
-            </a:pathLst>
-          </a:custGeom>
-          <a:noFill/>
-        </p:spPr>
-        <p:style>
-          <a:lnRef idx="2">
-            <a:schemeClr val="accent1">
-              <a:shade val="80000"/>
-              <a:hueOff val="0"/>
-              <a:satOff val="0"/>
-              <a:lumOff val="0"/>
-              <a:alphaOff val="0"/>
-            </a:schemeClr>
-          </a:lnRef>
-          <a:fillRef idx="0">
-            <a:scrgbClr r="0" g="0" b="0"/>
-          </a:fillRef>
-          <a:effectRef idx="0">
-            <a:schemeClr val="accent1">
-              <a:hueOff val="0"/>
-              <a:satOff val="0"/>
-              <a:lumOff val="0"/>
-              <a:alphaOff val="0"/>
-            </a:schemeClr>
-          </a:effectRef>
-          <a:fontRef idx="minor">
-            <a:schemeClr val="tx1">
-              <a:hueOff val="0"/>
-              <a:satOff val="0"/>
-              <a:lumOff val="0"/>
-              <a:alphaOff val="0"/>
-            </a:schemeClr>
-          </a:fontRef>
-        </p:style>
-      </p:sp>
-      <p:sp>
-        <p:nvSpPr>
-          <p:cNvPr id="42" name="Freeform 41"/>
-          <p:cNvSpPr/>
-          <p:nvPr/>
-        </p:nvSpPr>
-        <p:spPr>
-          <a:xfrm>
-            <a:off x="2713210" y="4165515"/>
-            <a:ext cx="139249" cy="427031"/>
-          </a:xfrm>
-          <a:custGeom>
-            <a:avLst/>
-            <a:gdLst/>
-            <a:ahLst/>
-            <a:cxnLst/>
-            <a:rect l="0" t="0" r="0" b="0"/>
-            <a:pathLst>
-              <a:path>
-                <a:moveTo>
-                  <a:pt x="0" y="0"/>
-                </a:moveTo>
-                <a:lnTo>
-                  <a:pt x="0" y="427031"/>
-                </a:lnTo>
-                <a:lnTo>
-                  <a:pt x="139249" y="427031"/>
-                </a:lnTo>
-              </a:path>
-            </a:pathLst>
-          </a:custGeom>
-          <a:noFill/>
-        </p:spPr>
-        <p:style>
-          <a:lnRef idx="2">
-            <a:schemeClr val="accent1">
-              <a:shade val="80000"/>
-              <a:hueOff val="0"/>
-              <a:satOff val="0"/>
-              <a:lumOff val="0"/>
-              <a:alphaOff val="0"/>
-            </a:schemeClr>
-          </a:lnRef>
-          <a:fillRef idx="0">
-            <a:scrgbClr r="0" g="0" b="0"/>
-          </a:fillRef>
-          <a:effectRef idx="0">
-            <a:schemeClr val="accent1">
-              <a:hueOff val="0"/>
-              <a:satOff val="0"/>
-              <a:lumOff val="0"/>
-              <a:alphaOff val="0"/>
-            </a:schemeClr>
-          </a:effectRef>
-          <a:fontRef idx="minor">
-            <a:schemeClr val="tx1">
-              <a:hueOff val="0"/>
-              <a:satOff val="0"/>
-              <a:lumOff val="0"/>
-              <a:alphaOff val="0"/>
-            </a:schemeClr>
-          </a:fontRef>
-        </p:style>
-      </p:sp>
-      <p:sp>
-        <p:nvSpPr>
-          <p:cNvPr id="45" name="Freeform 44"/>
-          <p:cNvSpPr/>
-          <p:nvPr/>
-        </p:nvSpPr>
-        <p:spPr>
-          <a:xfrm>
-            <a:off x="1589931" y="4165515"/>
-            <a:ext cx="139249" cy="427031"/>
-          </a:xfrm>
-          <a:custGeom>
-            <a:avLst/>
-            <a:gdLst/>
-            <a:ahLst/>
-            <a:cxnLst/>
-            <a:rect l="0" t="0" r="0" b="0"/>
-            <a:pathLst>
-              <a:path>
-                <a:moveTo>
-                  <a:pt x="0" y="0"/>
-                </a:moveTo>
-                <a:lnTo>
-                  <a:pt x="0" y="427031"/>
-                </a:lnTo>
-                <a:lnTo>
-                  <a:pt x="139249" y="427031"/>
-                </a:lnTo>
-              </a:path>
-            </a:pathLst>
-          </a:custGeom>
-          <a:noFill/>
-        </p:spPr>
-        <p:style>
-          <a:lnRef idx="2">
-            <a:schemeClr val="accent1">
-              <a:shade val="80000"/>
-              <a:hueOff val="0"/>
-              <a:satOff val="0"/>
-              <a:lumOff val="0"/>
-              <a:alphaOff val="0"/>
-            </a:schemeClr>
-          </a:lnRef>
-          <a:fillRef idx="0">
-            <a:scrgbClr r="0" g="0" b="0"/>
-          </a:fillRef>
-          <a:effectRef idx="0">
-            <a:schemeClr val="accent1">
-              <a:hueOff val="0"/>
-              <a:satOff val="0"/>
-              <a:lumOff val="0"/>
-              <a:alphaOff val="0"/>
-            </a:schemeClr>
-          </a:effectRef>
-          <a:fontRef idx="minor">
-            <a:schemeClr val="tx1">
-              <a:hueOff val="0"/>
-              <a:satOff val="0"/>
-              <a:lumOff val="0"/>
-              <a:alphaOff val="0"/>
-            </a:schemeClr>
-          </a:fontRef>
-        </p:style>
-      </p:sp>
-      <p:sp>
-        <p:nvSpPr>
-          <p:cNvPr id="46" name="Freeform 45"/>
-          <p:cNvSpPr/>
-          <p:nvPr/>
-        </p:nvSpPr>
-        <p:spPr>
-          <a:xfrm>
-            <a:off x="1399623" y="3506401"/>
-            <a:ext cx="561639" cy="194949"/>
-          </a:xfrm>
-          <a:custGeom>
-            <a:avLst/>
-            <a:gdLst/>
-            <a:ahLst/>
-            <a:cxnLst/>
-            <a:rect l="0" t="0" r="0" b="0"/>
-            <a:pathLst>
-              <a:path>
-                <a:moveTo>
-                  <a:pt x="0" y="0"/>
-                </a:moveTo>
-                <a:lnTo>
-                  <a:pt x="0" y="97474"/>
-                </a:lnTo>
-                <a:lnTo>
-                  <a:pt x="561639" y="97474"/>
-                </a:lnTo>
-                <a:lnTo>
-                  <a:pt x="561639" y="194949"/>
-                </a:lnTo>
-              </a:path>
-            </a:pathLst>
-          </a:custGeom>
-          <a:noFill/>
-        </p:spPr>
-        <p:style>
-          <a:lnRef idx="2">
-            <a:schemeClr val="accent1">
-              <a:shade val="80000"/>
-              <a:hueOff val="0"/>
-              <a:satOff val="0"/>
-              <a:lumOff val="0"/>
-              <a:alphaOff val="0"/>
-            </a:schemeClr>
-          </a:lnRef>
-          <a:fillRef idx="0">
-            <a:scrgbClr r="0" g="0" b="0"/>
-          </a:fillRef>
-          <a:effectRef idx="0">
-            <a:schemeClr val="accent1">
-              <a:hueOff val="0"/>
-              <a:satOff val="0"/>
-              <a:lumOff val="0"/>
-              <a:alphaOff val="0"/>
-            </a:schemeClr>
-          </a:effectRef>
-          <a:fontRef idx="minor">
-            <a:schemeClr val="tx1">
-              <a:hueOff val="0"/>
-              <a:satOff val="0"/>
-              <a:lumOff val="0"/>
-              <a:alphaOff val="0"/>
-            </a:schemeClr>
-          </a:fontRef>
-        </p:style>
-      </p:sp>
-      <p:sp>
-        <p:nvSpPr>
-          <p:cNvPr id="47" name="Freeform 46"/>
-          <p:cNvSpPr/>
-          <p:nvPr/>
-        </p:nvSpPr>
-        <p:spPr>
-          <a:xfrm>
-            <a:off x="466651" y="4165515"/>
-            <a:ext cx="139249" cy="427031"/>
-          </a:xfrm>
-          <a:custGeom>
-            <a:avLst/>
-            <a:gdLst/>
-            <a:ahLst/>
-            <a:cxnLst/>
-            <a:rect l="0" t="0" r="0" b="0"/>
-            <a:pathLst>
-              <a:path>
-                <a:moveTo>
-                  <a:pt x="0" y="0"/>
-                </a:moveTo>
-                <a:lnTo>
-                  <a:pt x="0" y="427031"/>
-                </a:lnTo>
-                <a:lnTo>
-                  <a:pt x="139249" y="427031"/>
-                </a:lnTo>
-              </a:path>
-            </a:pathLst>
-          </a:custGeom>
-          <a:noFill/>
-        </p:spPr>
-        <p:style>
-          <a:lnRef idx="2">
-            <a:schemeClr val="accent1">
-              <a:shade val="80000"/>
-              <a:hueOff val="0"/>
-              <a:satOff val="0"/>
-              <a:lumOff val="0"/>
-              <a:alphaOff val="0"/>
-            </a:schemeClr>
-          </a:lnRef>
-          <a:fillRef idx="0">
-            <a:scrgbClr r="0" g="0" b="0"/>
-          </a:fillRef>
-          <a:effectRef idx="0">
-            <a:schemeClr val="accent1">
-              <a:hueOff val="0"/>
-              <a:satOff val="0"/>
-              <a:lumOff val="0"/>
-              <a:alphaOff val="0"/>
-            </a:schemeClr>
-          </a:effectRef>
-          <a:fontRef idx="minor">
-            <a:schemeClr val="tx1">
-              <a:hueOff val="0"/>
-              <a:satOff val="0"/>
-              <a:lumOff val="0"/>
-              <a:alphaOff val="0"/>
-            </a:schemeClr>
-          </a:fontRef>
-        </p:style>
-      </p:sp>
-      <p:sp>
-        <p:nvSpPr>
-          <p:cNvPr id="48" name="Freeform 47"/>
-          <p:cNvSpPr/>
-          <p:nvPr/>
-        </p:nvSpPr>
-        <p:spPr>
-          <a:xfrm>
-            <a:off x="837984" y="3506401"/>
-            <a:ext cx="561639" cy="194949"/>
-          </a:xfrm>
-          <a:custGeom>
-            <a:avLst/>
-            <a:gdLst/>
-            <a:ahLst/>
-            <a:cxnLst/>
-            <a:rect l="0" t="0" r="0" b="0"/>
-            <a:pathLst>
-              <a:path>
-                <a:moveTo>
-                  <a:pt x="561639" y="0"/>
-                </a:moveTo>
-                <a:lnTo>
-                  <a:pt x="561639" y="97474"/>
-                </a:lnTo>
-                <a:lnTo>
-                  <a:pt x="0" y="97474"/>
-                </a:lnTo>
-                <a:lnTo>
-                  <a:pt x="0" y="194949"/>
-                </a:lnTo>
-              </a:path>
-            </a:pathLst>
-          </a:custGeom>
-          <a:noFill/>
-        </p:spPr>
-        <p:style>
-          <a:lnRef idx="2">
-            <a:schemeClr val="accent1">
-              <a:shade val="80000"/>
-              <a:hueOff val="0"/>
-              <a:satOff val="0"/>
-              <a:lumOff val="0"/>
-              <a:alphaOff val="0"/>
-            </a:schemeClr>
-          </a:lnRef>
-          <a:fillRef idx="0">
-            <a:scrgbClr r="0" g="0" b="0"/>
-          </a:fillRef>
-          <a:effectRef idx="0">
-            <a:schemeClr val="accent1">
-              <a:hueOff val="0"/>
-              <a:satOff val="0"/>
-              <a:lumOff val="0"/>
-              <a:alphaOff val="0"/>
-            </a:schemeClr>
-          </a:effectRef>
-          <a:fontRef idx="minor">
-            <a:schemeClr val="tx1">
-              <a:hueOff val="0"/>
-              <a:satOff val="0"/>
-              <a:lumOff val="0"/>
-              <a:alphaOff val="0"/>
-            </a:schemeClr>
-          </a:fontRef>
-        </p:style>
-      </p:sp>
-      <p:sp>
-        <p:nvSpPr>
-          <p:cNvPr id="49" name="Freeform 48"/>
-          <p:cNvSpPr/>
-          <p:nvPr/>
-        </p:nvSpPr>
-        <p:spPr>
-          <a:xfrm>
-            <a:off x="1399623" y="2847287"/>
-            <a:ext cx="1965738" cy="194949"/>
-          </a:xfrm>
-          <a:custGeom>
-            <a:avLst/>
-            <a:gdLst/>
-            <a:ahLst/>
-            <a:cxnLst/>
-            <a:rect l="0" t="0" r="0" b="0"/>
-            <a:pathLst>
-              <a:path>
-                <a:moveTo>
-                  <a:pt x="1965738" y="0"/>
-                </a:moveTo>
-                <a:lnTo>
-                  <a:pt x="1965738" y="97474"/>
-                </a:lnTo>
-                <a:lnTo>
-                  <a:pt x="0" y="97474"/>
-                </a:lnTo>
-                <a:lnTo>
-                  <a:pt x="0" y="194949"/>
-                </a:lnTo>
-              </a:path>
-            </a:pathLst>
-          </a:custGeom>
-          <a:noFill/>
-        </p:spPr>
-        <p:style>
-          <a:lnRef idx="2">
-            <a:schemeClr val="accent1">
-              <a:shade val="80000"/>
-              <a:hueOff val="0"/>
-              <a:satOff val="0"/>
-              <a:lumOff val="0"/>
-              <a:alphaOff val="0"/>
-            </a:schemeClr>
-          </a:lnRef>
-          <a:fillRef idx="0">
-            <a:scrgbClr r="0" g="0" b="0"/>
-          </a:fillRef>
-          <a:effectRef idx="0">
-            <a:schemeClr val="accent1">
-              <a:hueOff val="0"/>
-              <a:satOff val="0"/>
-              <a:lumOff val="0"/>
-              <a:alphaOff val="0"/>
-            </a:schemeClr>
-          </a:effectRef>
-          <a:fontRef idx="minor">
-            <a:schemeClr val="tx1">
-              <a:hueOff val="0"/>
-              <a:satOff val="0"/>
-              <a:lumOff val="0"/>
-              <a:alphaOff val="0"/>
-            </a:schemeClr>
-          </a:fontRef>
-        </p:style>
-      </p:sp>
-      <p:sp>
-        <p:nvSpPr>
           <p:cNvPr id="51" name="Freeform 50"/>
           <p:cNvSpPr/>
           <p:nvPr/>
@@ -4352,7 +3395,7 @@
           <a:noFill/>
           <a:ln w="19050">
             <a:solidFill>
-              <a:srgbClr val="00B050"/>
+              <a:schemeClr val="accent1"/>
             </a:solidFill>
           </a:ln>
         </p:spPr>
@@ -4696,7 +3739,7 @@
         </p:nvSpPr>
         <p:spPr>
           <a:xfrm>
-            <a:off x="605901" y="4360465"/>
+            <a:off x="412352" y="4360465"/>
             <a:ext cx="928330" cy="464165"/>
           </a:xfrm>
           <a:custGeom>
@@ -4939,7 +3982,7 @@
         </p:nvSpPr>
         <p:spPr>
           <a:xfrm>
-            <a:off x="1729180" y="4360465"/>
+            <a:off x="1562322" y="4360465"/>
             <a:ext cx="928330" cy="464165"/>
           </a:xfrm>
           <a:custGeom>
@@ -5063,7 +4106,7 @@
         </p:nvSpPr>
         <p:spPr>
           <a:xfrm>
-            <a:off x="2620377" y="3701350"/>
+            <a:off x="2713819" y="3701350"/>
             <a:ext cx="928330" cy="464165"/>
           </a:xfrm>
           <a:custGeom>
@@ -5208,7 +4251,7 @@
         </p:nvSpPr>
         <p:spPr>
           <a:xfrm>
-            <a:off x="2852460" y="4360465"/>
+            <a:off x="2765693" y="4327093"/>
             <a:ext cx="928330" cy="464165"/>
           </a:xfrm>
           <a:custGeom>
@@ -5392,7 +4435,7 @@
           <a:noFill/>
           <a:ln w="19050">
             <a:solidFill>
-              <a:srgbClr val="00B050"/>
+              <a:schemeClr val="accent1"/>
             </a:solidFill>
           </a:ln>
         </p:spPr>
@@ -5465,159 +4508,6 @@
         <p:spPr>
           <a:xfrm>
             <a:off x="3743657" y="3701350"/>
-            <a:ext cx="928330" cy="464165"/>
-          </a:xfrm>
-          <a:custGeom>
-            <a:avLst/>
-            <a:gdLst>
-              <a:gd name="connsiteX0" fmla="*/ 0 w 928330"/>
-              <a:gd name="connsiteY0" fmla="*/ 0 h 464165"/>
-              <a:gd name="connsiteX1" fmla="*/ 928330 w 928330"/>
-              <a:gd name="connsiteY1" fmla="*/ 0 h 464165"/>
-              <a:gd name="connsiteX2" fmla="*/ 928330 w 928330"/>
-              <a:gd name="connsiteY2" fmla="*/ 464165 h 464165"/>
-              <a:gd name="connsiteX3" fmla="*/ 0 w 928330"/>
-              <a:gd name="connsiteY3" fmla="*/ 464165 h 464165"/>
-              <a:gd name="connsiteX4" fmla="*/ 0 w 928330"/>
-              <a:gd name="connsiteY4" fmla="*/ 0 h 464165"/>
-            </a:gdLst>
-            <a:ahLst/>
-            <a:cxnLst>
-              <a:cxn ang="0">
-                <a:pos x="connsiteX0" y="connsiteY0"/>
-              </a:cxn>
-              <a:cxn ang="0">
-                <a:pos x="connsiteX1" y="connsiteY1"/>
-              </a:cxn>
-              <a:cxn ang="0">
-                <a:pos x="connsiteX2" y="connsiteY2"/>
-              </a:cxn>
-              <a:cxn ang="0">
-                <a:pos x="connsiteX3" y="connsiteY3"/>
-              </a:cxn>
-              <a:cxn ang="0">
-                <a:pos x="connsiteX4" y="connsiteY4"/>
-              </a:cxn>
-            </a:cxnLst>
-            <a:rect l="l" t="t" r="r" b="b"/>
-            <a:pathLst>
-              <a:path w="928330" h="464165">
-                <a:moveTo>
-                  <a:pt x="0" y="0"/>
-                </a:moveTo>
-                <a:lnTo>
-                  <a:pt x="928330" y="0"/>
-                </a:lnTo>
-                <a:lnTo>
-                  <a:pt x="928330" y="464165"/>
-                </a:lnTo>
-                <a:lnTo>
-                  <a:pt x="0" y="464165"/>
-                </a:lnTo>
-                <a:lnTo>
-                  <a:pt x="0" y="0"/>
-                </a:lnTo>
-                <a:close/>
-              </a:path>
-            </a:pathLst>
-          </a:custGeom>
-          <a:noFill/>
-          <a:ln w="19050">
-            <a:solidFill>
-              <a:srgbClr val="00B050"/>
-            </a:solidFill>
-          </a:ln>
-        </p:spPr>
-        <p:style>
-          <a:lnRef idx="2">
-            <a:scrgbClr r="0" g="0" b="0"/>
-          </a:lnRef>
-          <a:fillRef idx="1">
-            <a:scrgbClr r="0" g="0" b="0"/>
-          </a:fillRef>
-          <a:effectRef idx="0">
-            <a:schemeClr val="accent1">
-              <a:hueOff val="0"/>
-              <a:satOff val="0"/>
-              <a:lumOff val="0"/>
-              <a:alphaOff val="0"/>
-            </a:schemeClr>
-          </a:effectRef>
-          <a:fontRef idx="minor">
-            <a:schemeClr val="lt1"/>
-          </a:fontRef>
-        </p:style>
-        <p:txBody>
-          <a:bodyPr spcFirstLastPara="0" vert="horz" wrap="square" lIns="7620" tIns="7620" rIns="7620" bIns="7620" numCol="1" spcCol="1270" anchor="ctr" anchorCtr="0">
-            <a:noAutofit/>
-          </a:bodyPr>
-          <a:lstStyle/>
-          <a:p>
-            <a:pPr lvl="0" algn="ctr" defTabSz="533400">
-              <a:lnSpc>
-                <a:spcPct val="90000"/>
-              </a:lnSpc>
-              <a:spcBef>
-                <a:spcPct val="0"/>
-              </a:spcBef>
-              <a:spcAft>
-                <a:spcPts val="0"/>
-              </a:spcAft>
-            </a:pPr>
-            <a:r>
-              <a:rPr lang="en-US" sz="1100" kern="1200" dirty="0" smtClean="0">
-                <a:solidFill>
-                  <a:schemeClr val="tx1"/>
-                </a:solidFill>
-              </a:rPr>
-              <a:t>SNS catalog </a:t>
-            </a:r>
-            <a:r>
-              <a:rPr lang="en-US" sz="1100" kern="1200" dirty="0" err="1" smtClean="0">
-                <a:solidFill>
-                  <a:schemeClr val="tx1"/>
-                </a:solidFill>
-              </a:rPr>
-              <a:t>inTranscript</a:t>
-            </a:r>
-            <a:endParaRPr lang="en-US" sz="1100" kern="1200" dirty="0" smtClean="0">
-              <a:solidFill>
-                <a:schemeClr val="tx1"/>
-              </a:solidFill>
-            </a:endParaRPr>
-          </a:p>
-          <a:p>
-            <a:pPr lvl="0" algn="ctr" defTabSz="533400">
-              <a:lnSpc>
-                <a:spcPct val="90000"/>
-              </a:lnSpc>
-              <a:spcBef>
-                <a:spcPct val="0"/>
-              </a:spcBef>
-              <a:spcAft>
-                <a:spcPts val="0"/>
-              </a:spcAft>
-            </a:pPr>
-            <a:r>
-              <a:rPr lang="en-US" sz="1100" kern="1200" dirty="0" smtClean="0">
-                <a:solidFill>
-                  <a:schemeClr val="tx1"/>
-                </a:solidFill>
-              </a:rPr>
-              <a:t>(192)</a:t>
-            </a:r>
-          </a:p>
-        </p:txBody>
-      </p:sp>
-      <p:sp>
-        <p:nvSpPr>
-          <p:cNvPr id="63" name="Freeform 62"/>
-          <p:cNvSpPr/>
-          <p:nvPr/>
-        </p:nvSpPr>
-        <p:spPr>
-          <a:xfrm>
-            <a:off x="3975739" y="4360465"/>
             <a:ext cx="928330" cy="464165"/>
           </a:xfrm>
           <a:custGeom>
@@ -5723,25 +4613,54 @@
                   <a:schemeClr val="tx1"/>
                 </a:solidFill>
               </a:rPr>
-              <a:t>Plot</a:t>
-            </a:r>
-            <a:endParaRPr lang="en-US" sz="1100" kern="1200" dirty="0">
+              <a:t>SNS catalog </a:t>
+            </a:r>
+            <a:r>
+              <a:rPr lang="en-US" sz="1100" kern="1200" dirty="0" err="1" smtClean="0">
+                <a:solidFill>
+                  <a:schemeClr val="tx1"/>
+                </a:solidFill>
+              </a:rPr>
+              <a:t>inTranscript</a:t>
+            </a:r>
+            <a:endParaRPr lang="en-US" sz="1100" kern="1200" dirty="0" smtClean="0">
               <a:solidFill>
                 <a:schemeClr val="tx1"/>
               </a:solidFill>
             </a:endParaRPr>
           </a:p>
-        </p:txBody>
-      </p:sp>
-      <p:sp>
-        <p:nvSpPr>
-          <p:cNvPr id="64" name="Freeform 63"/>
+          <a:p>
+            <a:pPr lvl="0" algn="ctr" defTabSz="533400">
+              <a:lnSpc>
+                <a:spcPct val="90000"/>
+              </a:lnSpc>
+              <a:spcBef>
+                <a:spcPct val="0"/>
+              </a:spcBef>
+              <a:spcAft>
+                <a:spcPts val="0"/>
+              </a:spcAft>
+            </a:pPr>
+            <a:r>
+              <a:rPr lang="en-US" sz="1100" kern="1200" dirty="0" smtClean="0">
+                <a:solidFill>
+                  <a:schemeClr val="tx1"/>
+                </a:solidFill>
+              </a:rPr>
+              <a:t>(192)</a:t>
+            </a:r>
+          </a:p>
+        </p:txBody>
+      </p:sp>
+      <p:sp>
+        <p:nvSpPr>
+          <p:cNvPr id="63" name="Freeform 62"/>
           <p:cNvSpPr/>
           <p:nvPr/>
         </p:nvSpPr>
         <p:spPr>
           <a:xfrm>
-            <a:off x="3975739" y="5019579"/>
+            <a:off x="3782180" y="4367139"/>
             <a:ext cx="928330" cy="464165"/>
           </a:xfrm>
           <a:custGeom>
@@ -5842,6 +4761,130 @@
               </a:spcAft>
             </a:pPr>
             <a:r>
+              <a:rPr lang="en-US" sz="1100" kern="1200" dirty="0" smtClean="0">
+                <a:solidFill>
+                  <a:schemeClr val="tx1"/>
+                </a:solidFill>
+              </a:rPr>
+              <a:t>Plot</a:t>
+            </a:r>
+            <a:endParaRPr lang="en-US" sz="1100" kern="1200" dirty="0">
+              <a:solidFill>
+                <a:schemeClr val="tx1"/>
+              </a:solidFill>
+            </a:endParaRPr>
+          </a:p>
+        </p:txBody>
+      </p:sp>
+      <p:sp>
+        <p:nvSpPr>
+          <p:cNvPr id="64" name="Freeform 63"/>
+          <p:cNvSpPr/>
+          <p:nvPr/>
+        </p:nvSpPr>
+        <p:spPr>
+          <a:xfrm>
+            <a:off x="3782180" y="4832694"/>
+            <a:ext cx="928330" cy="464165"/>
+          </a:xfrm>
+          <a:custGeom>
+            <a:avLst/>
+            <a:gdLst>
+              <a:gd name="connsiteX0" fmla="*/ 0 w 928330"/>
+              <a:gd name="connsiteY0" fmla="*/ 0 h 464165"/>
+              <a:gd name="connsiteX1" fmla="*/ 928330 w 928330"/>
+              <a:gd name="connsiteY1" fmla="*/ 0 h 464165"/>
+              <a:gd name="connsiteX2" fmla="*/ 928330 w 928330"/>
+              <a:gd name="connsiteY2" fmla="*/ 464165 h 464165"/>
+              <a:gd name="connsiteX3" fmla="*/ 0 w 928330"/>
+              <a:gd name="connsiteY3" fmla="*/ 464165 h 464165"/>
+              <a:gd name="connsiteX4" fmla="*/ 0 w 928330"/>
+              <a:gd name="connsiteY4" fmla="*/ 0 h 464165"/>
+            </a:gdLst>
+            <a:ahLst/>
+            <a:cxnLst>
+              <a:cxn ang="0">
+                <a:pos x="connsiteX0" y="connsiteY0"/>
+              </a:cxn>
+              <a:cxn ang="0">
+                <a:pos x="connsiteX1" y="connsiteY1"/>
+              </a:cxn>
+              <a:cxn ang="0">
+                <a:pos x="connsiteX2" y="connsiteY2"/>
+              </a:cxn>
+              <a:cxn ang="0">
+                <a:pos x="connsiteX3" y="connsiteY3"/>
+              </a:cxn>
+              <a:cxn ang="0">
+                <a:pos x="connsiteX4" y="connsiteY4"/>
+              </a:cxn>
+            </a:cxnLst>
+            <a:rect l="l" t="t" r="r" b="b"/>
+            <a:pathLst>
+              <a:path w="928330" h="464165">
+                <a:moveTo>
+                  <a:pt x="0" y="0"/>
+                </a:moveTo>
+                <a:lnTo>
+                  <a:pt x="928330" y="0"/>
+                </a:lnTo>
+                <a:lnTo>
+                  <a:pt x="928330" y="464165"/>
+                </a:lnTo>
+                <a:lnTo>
+                  <a:pt x="0" y="464165"/>
+                </a:lnTo>
+                <a:lnTo>
+                  <a:pt x="0" y="0"/>
+                </a:lnTo>
+                <a:close/>
+              </a:path>
+            </a:pathLst>
+          </a:custGeom>
+          <a:noFill/>
+          <a:ln w="19050">
+            <a:solidFill>
+              <a:schemeClr val="accent1"/>
+            </a:solidFill>
+          </a:ln>
+        </p:spPr>
+        <p:style>
+          <a:lnRef idx="2">
+            <a:scrgbClr r="0" g="0" b="0"/>
+          </a:lnRef>
+          <a:fillRef idx="1">
+            <a:scrgbClr r="0" g="0" b="0"/>
+          </a:fillRef>
+          <a:effectRef idx="0">
+            <a:schemeClr val="accent1">
+              <a:hueOff val="0"/>
+              <a:satOff val="0"/>
+              <a:lumOff val="0"/>
+              <a:alphaOff val="0"/>
+            </a:schemeClr>
+          </a:effectRef>
+          <a:fontRef idx="minor">
+            <a:schemeClr val="lt1"/>
+          </a:fontRef>
+        </p:style>
+        <p:txBody>
+          <a:bodyPr spcFirstLastPara="0" vert="horz" wrap="square" lIns="7620" tIns="7620" rIns="7620" bIns="7620" numCol="1" spcCol="1270" anchor="ctr" anchorCtr="0">
+            <a:noAutofit/>
+          </a:bodyPr>
+          <a:lstStyle/>
+          <a:p>
+            <a:pPr lvl="0" algn="ctr" defTabSz="533400">
+              <a:lnSpc>
+                <a:spcPct val="90000"/>
+              </a:lnSpc>
+              <a:spcBef>
+                <a:spcPct val="0"/>
+              </a:spcBef>
+              <a:spcAft>
+                <a:spcPts val="0"/>
+              </a:spcAft>
+            </a:pPr>
+            <a:r>
               <a:rPr lang="en-US" sz="1100" kern="1200" dirty="0" err="1" smtClean="0">
                 <a:solidFill>
                   <a:schemeClr val="tx1"/>
@@ -5881,7 +4924,7 @@
         </p:nvSpPr>
         <p:spPr>
           <a:xfrm>
-            <a:off x="3975739" y="5874460"/>
+            <a:off x="3775506" y="5340504"/>
             <a:ext cx="928330" cy="464165"/>
           </a:xfrm>
           <a:custGeom>
@@ -6007,7 +5050,7 @@
         </p:nvSpPr>
         <p:spPr>
           <a:xfrm>
-            <a:off x="5088584" y="5875137"/>
+            <a:off x="5008491" y="5494693"/>
             <a:ext cx="928330" cy="464165"/>
           </a:xfrm>
           <a:custGeom>
@@ -6191,7 +5234,7 @@
           <a:noFill/>
           <a:ln w="19050">
             <a:solidFill>
-              <a:srgbClr val="00B050"/>
+              <a:schemeClr val="accent1"/>
             </a:solidFill>
           </a:ln>
         </p:spPr>
@@ -6292,131 +5335,7 @@
         </p:nvSpPr>
         <p:spPr>
           <a:xfrm>
-            <a:off x="5099018" y="4360465"/>
-            <a:ext cx="928330" cy="464165"/>
-          </a:xfrm>
-          <a:custGeom>
-            <a:avLst/>
-            <a:gdLst>
-              <a:gd name="connsiteX0" fmla="*/ 0 w 928330"/>
-              <a:gd name="connsiteY0" fmla="*/ 0 h 464165"/>
-              <a:gd name="connsiteX1" fmla="*/ 928330 w 928330"/>
-              <a:gd name="connsiteY1" fmla="*/ 0 h 464165"/>
-              <a:gd name="connsiteX2" fmla="*/ 928330 w 928330"/>
-              <a:gd name="connsiteY2" fmla="*/ 464165 h 464165"/>
-              <a:gd name="connsiteX3" fmla="*/ 0 w 928330"/>
-              <a:gd name="connsiteY3" fmla="*/ 464165 h 464165"/>
-              <a:gd name="connsiteX4" fmla="*/ 0 w 928330"/>
-              <a:gd name="connsiteY4" fmla="*/ 0 h 464165"/>
-            </a:gdLst>
-            <a:ahLst/>
-            <a:cxnLst>
-              <a:cxn ang="0">
-                <a:pos x="connsiteX0" y="connsiteY0"/>
-              </a:cxn>
-              <a:cxn ang="0">
-                <a:pos x="connsiteX1" y="connsiteY1"/>
-              </a:cxn>
-              <a:cxn ang="0">
-                <a:pos x="connsiteX2" y="connsiteY2"/>
-              </a:cxn>
-              <a:cxn ang="0">
-                <a:pos x="connsiteX3" y="connsiteY3"/>
-              </a:cxn>
-              <a:cxn ang="0">
-                <a:pos x="connsiteX4" y="connsiteY4"/>
-              </a:cxn>
-            </a:cxnLst>
-            <a:rect l="l" t="t" r="r" b="b"/>
-            <a:pathLst>
-              <a:path w="928330" h="464165">
-                <a:moveTo>
-                  <a:pt x="0" y="0"/>
-                </a:moveTo>
-                <a:lnTo>
-                  <a:pt x="928330" y="0"/>
-                </a:lnTo>
-                <a:lnTo>
-                  <a:pt x="928330" y="464165"/>
-                </a:lnTo>
-                <a:lnTo>
-                  <a:pt x="0" y="464165"/>
-                </a:lnTo>
-                <a:lnTo>
-                  <a:pt x="0" y="0"/>
-                </a:lnTo>
-                <a:close/>
-              </a:path>
-            </a:pathLst>
-          </a:custGeom>
-          <a:noFill/>
-          <a:ln w="19050">
-            <a:solidFill>
-              <a:schemeClr val="accent6"/>
-            </a:solidFill>
-          </a:ln>
-        </p:spPr>
-        <p:style>
-          <a:lnRef idx="2">
-            <a:scrgbClr r="0" g="0" b="0"/>
-          </a:lnRef>
-          <a:fillRef idx="1">
-            <a:scrgbClr r="0" g="0" b="0"/>
-          </a:fillRef>
-          <a:effectRef idx="0">
-            <a:schemeClr val="accent1">
-              <a:hueOff val="0"/>
-              <a:satOff val="0"/>
-              <a:lumOff val="0"/>
-              <a:alphaOff val="0"/>
-            </a:schemeClr>
-          </a:effectRef>
-          <a:fontRef idx="minor">
-            <a:schemeClr val="lt1"/>
-          </a:fontRef>
-        </p:style>
-        <p:txBody>
-          <a:bodyPr spcFirstLastPara="0" vert="horz" wrap="square" lIns="7620" tIns="7620" rIns="7620" bIns="7620" numCol="1" spcCol="1270" anchor="ctr" anchorCtr="0">
-            <a:noAutofit/>
-          </a:bodyPr>
-          <a:lstStyle/>
-          <a:p>
-            <a:pPr lvl="0" algn="ctr" defTabSz="533400">
-              <a:lnSpc>
-                <a:spcPct val="90000"/>
-              </a:lnSpc>
-              <a:spcBef>
-                <a:spcPct val="0"/>
-              </a:spcBef>
-              <a:spcAft>
-                <a:spcPts val="0"/>
-              </a:spcAft>
-            </a:pPr>
-            <a:r>
-              <a:rPr lang="en-US" sz="1100" kern="1200" dirty="0" smtClean="0">
-                <a:solidFill>
-                  <a:schemeClr val="tx1"/>
-                </a:solidFill>
-              </a:rPr>
-              <a:t>Plot</a:t>
-            </a:r>
-            <a:endParaRPr lang="en-US" sz="1100" kern="1200" dirty="0">
-              <a:solidFill>
-                <a:schemeClr val="tx1"/>
-              </a:solidFill>
-            </a:endParaRPr>
-          </a:p>
-        </p:txBody>
-      </p:sp>
-      <p:sp>
-        <p:nvSpPr>
-          <p:cNvPr id="70" name="Freeform 69"/>
-          <p:cNvSpPr/>
-          <p:nvPr/>
-        </p:nvSpPr>
-        <p:spPr>
-          <a:xfrm>
-            <a:off x="5099018" y="5019579"/>
+            <a:off x="4985552" y="4280372"/>
             <a:ext cx="928330" cy="464165"/>
           </a:xfrm>
           <a:custGeom>
@@ -6517,20 +5436,12 @@
               </a:spcAft>
             </a:pPr>
             <a:r>
-              <a:rPr lang="en-US" sz="1100" kern="1200" dirty="0" err="1" smtClean="0">
-                <a:solidFill>
-                  <a:schemeClr val="tx1"/>
-                </a:solidFill>
-              </a:rPr>
-              <a:t>Binom.test</a:t>
-            </a:r>
-            <a:r>
               <a:rPr lang="en-US" sz="1100" kern="1200" dirty="0" smtClean="0">
                 <a:solidFill>
                   <a:schemeClr val="tx1"/>
                 </a:solidFill>
               </a:rPr>
-              <a:t> for enrichment</a:t>
+              <a:t>Plot</a:t>
             </a:r>
             <a:endParaRPr lang="en-US" sz="1100" kern="1200" dirty="0">
               <a:solidFill>
@@ -6542,171 +5453,13 @@
       </p:sp>
       <p:sp>
         <p:nvSpPr>
-          <p:cNvPr id="71" name="Freeform 70"/>
+          <p:cNvPr id="70" name="Freeform 69"/>
           <p:cNvSpPr/>
           <p:nvPr/>
         </p:nvSpPr>
         <p:spPr>
           <a:xfrm>
-            <a:off x="7394314" y="2377338"/>
-            <a:ext cx="928330" cy="464165"/>
-          </a:xfrm>
-          <a:custGeom>
-            <a:avLst/>
-            <a:gdLst>
-              <a:gd name="connsiteX0" fmla="*/ 0 w 928330"/>
-              <a:gd name="connsiteY0" fmla="*/ 0 h 464165"/>
-              <a:gd name="connsiteX1" fmla="*/ 928330 w 928330"/>
-              <a:gd name="connsiteY1" fmla="*/ 0 h 464165"/>
-              <a:gd name="connsiteX2" fmla="*/ 928330 w 928330"/>
-              <a:gd name="connsiteY2" fmla="*/ 464165 h 464165"/>
-              <a:gd name="connsiteX3" fmla="*/ 0 w 928330"/>
-              <a:gd name="connsiteY3" fmla="*/ 464165 h 464165"/>
-              <a:gd name="connsiteX4" fmla="*/ 0 w 928330"/>
-              <a:gd name="connsiteY4" fmla="*/ 0 h 464165"/>
-            </a:gdLst>
-            <a:ahLst/>
-            <a:cxnLst>
-              <a:cxn ang="0">
-                <a:pos x="connsiteX0" y="connsiteY0"/>
-              </a:cxn>
-              <a:cxn ang="0">
-                <a:pos x="connsiteX1" y="connsiteY1"/>
-              </a:cxn>
-              <a:cxn ang="0">
-                <a:pos x="connsiteX2" y="connsiteY2"/>
-              </a:cxn>
-              <a:cxn ang="0">
-                <a:pos x="connsiteX3" y="connsiteY3"/>
-              </a:cxn>
-              <a:cxn ang="0">
-                <a:pos x="connsiteX4" y="connsiteY4"/>
-              </a:cxn>
-            </a:cxnLst>
-            <a:rect l="l" t="t" r="r" b="b"/>
-            <a:pathLst>
-              <a:path w="928330" h="464165">
-                <a:moveTo>
-                  <a:pt x="0" y="0"/>
-                </a:moveTo>
-                <a:lnTo>
-                  <a:pt x="928330" y="0"/>
-                </a:lnTo>
-                <a:lnTo>
-                  <a:pt x="928330" y="464165"/>
-                </a:lnTo>
-                <a:lnTo>
-                  <a:pt x="0" y="464165"/>
-                </a:lnTo>
-                <a:lnTo>
-                  <a:pt x="0" y="0"/>
-                </a:lnTo>
-                <a:close/>
-              </a:path>
-            </a:pathLst>
-          </a:custGeom>
-          <a:noFill/>
-          <a:ln w="19050">
-            <a:solidFill>
-              <a:srgbClr val="00B050"/>
-            </a:solidFill>
-          </a:ln>
-        </p:spPr>
-        <p:style>
-          <a:lnRef idx="2">
-            <a:scrgbClr r="0" g="0" b="0"/>
-          </a:lnRef>
-          <a:fillRef idx="1">
-            <a:scrgbClr r="0" g="0" b="0"/>
-          </a:fillRef>
-          <a:effectRef idx="0">
-            <a:schemeClr val="accent1">
-              <a:hueOff val="0"/>
-              <a:satOff val="0"/>
-              <a:lumOff val="0"/>
-              <a:alphaOff val="0"/>
-            </a:schemeClr>
-          </a:effectRef>
-          <a:fontRef idx="minor">
-            <a:schemeClr val="lt1"/>
-          </a:fontRef>
-        </p:style>
-        <p:txBody>
-          <a:bodyPr spcFirstLastPara="0" vert="horz" wrap="square" lIns="7620" tIns="7620" rIns="7620" bIns="7620" numCol="1" spcCol="1270" anchor="ctr" anchorCtr="0">
-            <a:noAutofit/>
-          </a:bodyPr>
-          <a:lstStyle/>
-          <a:p>
-            <a:pPr lvl="0" algn="ctr" defTabSz="533400">
-              <a:lnSpc>
-                <a:spcPct val="90000"/>
-              </a:lnSpc>
-              <a:spcBef>
-                <a:spcPct val="0"/>
-              </a:spcBef>
-              <a:spcAft>
-                <a:spcPts val="0"/>
-              </a:spcAft>
-            </a:pPr>
-            <a:r>
-              <a:rPr lang="en-US" sz="1100" dirty="0" smtClean="0">
-                <a:solidFill>
-                  <a:schemeClr val="tx1"/>
-                </a:solidFill>
-              </a:rPr>
-              <a:t>DNS </a:t>
-            </a:r>
-            <a:r>
-              <a:rPr lang="en-US" sz="1100" dirty="0" err="1" smtClean="0">
-                <a:solidFill>
-                  <a:schemeClr val="tx1"/>
-                </a:solidFill>
-              </a:rPr>
-              <a:t>vcf</a:t>
-            </a:r>
-            <a:endParaRPr lang="en-US" sz="1100" dirty="0" smtClean="0">
-              <a:solidFill>
-                <a:schemeClr val="tx1"/>
-              </a:solidFill>
-            </a:endParaRPr>
-          </a:p>
-          <a:p>
-            <a:pPr lvl="0" algn="ctr" defTabSz="533400">
-              <a:lnSpc>
-                <a:spcPct val="90000"/>
-              </a:lnSpc>
-              <a:spcBef>
-                <a:spcPct val="0"/>
-              </a:spcBef>
-              <a:spcAft>
-                <a:spcPts val="0"/>
-              </a:spcAft>
-            </a:pPr>
-            <a:r>
-              <a:rPr lang="en-US" sz="1100" kern="1200" dirty="0" smtClean="0">
-                <a:solidFill>
-                  <a:schemeClr val="tx1"/>
-                </a:solidFill>
-              </a:rPr>
-              <a:t>(no SNSs)</a:t>
-            </a:r>
-            <a:endParaRPr lang="en-US" sz="1100" kern="1200" dirty="0">
-              <a:solidFill>
-                <a:schemeClr val="tx1"/>
-              </a:solidFill>
-            </a:endParaRPr>
-          </a:p>
-        </p:txBody>
-      </p:sp>
-      <p:sp>
-        <p:nvSpPr>
-          <p:cNvPr id="73" name="Freeform 72"/>
-          <p:cNvSpPr/>
-          <p:nvPr/>
-        </p:nvSpPr>
-        <p:spPr>
-          <a:xfrm>
-            <a:off x="6001938" y="3642734"/>
+            <a:off x="5038948" y="4892764"/>
             <a:ext cx="928330" cy="464165"/>
           </a:xfrm>
           <a:custGeom>
@@ -6807,20 +5560,12 @@
               </a:spcAft>
             </a:pPr>
             <a:r>
-              <a:rPr lang="en-US" sz="1100" dirty="0" err="1" smtClean="0">
+              <a:rPr lang="en-US" sz="1100" kern="1200" dirty="0" err="1" smtClean="0">
                 <a:solidFill>
                   <a:schemeClr val="tx1"/>
                 </a:solidFill>
               </a:rPr>
-              <a:t>Unstranded</a:t>
-            </a:r>
-            <a:r>
-              <a:rPr lang="en-US" sz="1100" dirty="0" smtClean="0">
-                <a:solidFill>
-                  <a:schemeClr val="tx1"/>
-                </a:solidFill>
-              </a:rPr>
-              <a:t> DNS </a:t>
+              <a:t>Binom.test</a:t>
             </a:r>
             <a:r>
               <a:rPr lang="en-US" sz="1100" kern="1200" dirty="0" smtClean="0">
@@ -6828,28 +5573,7 @@
                   <a:schemeClr val="tx1"/>
                 </a:solidFill>
               </a:rPr>
-              <a:t>catalog</a:t>
-            </a:r>
-          </a:p>
-          <a:p>
-            <a:pPr lvl="0" algn="ctr" defTabSz="533400">
-              <a:lnSpc>
-                <a:spcPct val="90000"/>
-              </a:lnSpc>
-              <a:spcBef>
-                <a:spcPct val="0"/>
-              </a:spcBef>
-              <a:spcAft>
-                <a:spcPts val="0"/>
-              </a:spcAft>
-            </a:pPr>
-            <a:r>
-              <a:rPr lang="en-US" sz="1100" kern="1200" dirty="0" smtClean="0">
-                <a:solidFill>
-                  <a:schemeClr val="tx1"/>
-                </a:solidFill>
-              </a:rPr>
-              <a:t>(78)</a:t>
+              <a:t> for enrichment</a:t>
             </a:r>
             <a:endParaRPr lang="en-US" sz="1100" kern="1200" dirty="0">
               <a:solidFill>
@@ -6861,13 +5585,13 @@
       </p:sp>
       <p:sp>
         <p:nvSpPr>
-          <p:cNvPr id="74" name="Freeform 73"/>
+          <p:cNvPr id="71" name="Freeform 70"/>
           <p:cNvSpPr/>
           <p:nvPr/>
         </p:nvSpPr>
         <p:spPr>
           <a:xfrm>
-            <a:off x="6222298" y="4360465"/>
+            <a:off x="7394314" y="2377338"/>
             <a:ext cx="928330" cy="464165"/>
           </a:xfrm>
           <a:custGeom>
@@ -6968,12 +5692,46 @@
               </a:spcAft>
             </a:pPr>
             <a:r>
+              <a:rPr lang="en-US" sz="1100" dirty="0" smtClean="0">
+                <a:solidFill>
+                  <a:schemeClr val="tx1"/>
+                </a:solidFill>
+              </a:rPr>
+              <a:t>DNS </a:t>
+            </a:r>
+            <a:r>
+              <a:rPr lang="en-US" sz="1100" dirty="0" err="1" smtClean="0">
+                <a:solidFill>
+                  <a:schemeClr val="tx1"/>
+                </a:solidFill>
+              </a:rPr>
+              <a:t>vcf</a:t>
+            </a:r>
+            <a:endParaRPr lang="en-US" sz="1100" dirty="0" smtClean="0">
+              <a:solidFill>
+                <a:schemeClr val="tx1"/>
+              </a:solidFill>
+            </a:endParaRPr>
+          </a:p>
+          <a:p>
+            <a:pPr lvl="0" algn="ctr" defTabSz="533400">
+              <a:lnSpc>
+                <a:spcPct val="90000"/>
+              </a:lnSpc>
+              <a:spcBef>
+                <a:spcPct val="0"/>
+              </a:spcBef>
+              <a:spcAft>
+                <a:spcPts val="0"/>
+              </a:spcAft>
+            </a:pPr>
+            <a:r>
               <a:rPr lang="en-US" sz="1100" kern="1200" dirty="0" smtClean="0">
                 <a:solidFill>
                   <a:schemeClr val="tx1"/>
                 </a:solidFill>
               </a:rPr>
-              <a:t>Plot</a:t>
+              <a:t>(no SNSs)</a:t>
             </a:r>
             <a:endParaRPr lang="en-US" sz="1100" kern="1200" dirty="0">
               <a:solidFill>
@@ -6985,13 +5743,13 @@
       </p:sp>
       <p:sp>
         <p:nvSpPr>
-          <p:cNvPr id="75" name="Freeform 74"/>
+          <p:cNvPr id="73" name="Freeform 72"/>
           <p:cNvSpPr/>
           <p:nvPr/>
         </p:nvSpPr>
         <p:spPr>
           <a:xfrm>
-            <a:off x="7113495" y="3701350"/>
+            <a:off x="6001938" y="3642734"/>
             <a:ext cx="928330" cy="464165"/>
           </a:xfrm>
           <a:custGeom>
@@ -7092,20 +5850,28 @@
               </a:spcAft>
             </a:pPr>
             <a:r>
+              <a:rPr lang="en-US" sz="1100" dirty="0" err="1" smtClean="0">
+                <a:solidFill>
+                  <a:schemeClr val="tx1"/>
+                </a:solidFill>
+              </a:rPr>
+              <a:t>Unstranded</a:t>
+            </a:r>
+            <a:r>
               <a:rPr lang="en-US" sz="1100" dirty="0" smtClean="0">
                 <a:solidFill>
                   <a:schemeClr val="tx1"/>
                 </a:solidFill>
               </a:rPr>
-              <a:t>Stranded </a:t>
-            </a:r>
-            <a:r>
-              <a:rPr lang="en-US" sz="1100" dirty="0">
+              <a:t> DNS </a:t>
+            </a:r>
+            <a:r>
+              <a:rPr lang="en-US" sz="1100" kern="1200" dirty="0" smtClean="0">
                 <a:solidFill>
                   <a:schemeClr val="tx1"/>
                 </a:solidFill>
               </a:rPr>
-              <a:t>DNS catalog</a:t>
+              <a:t>catalog</a:t>
             </a:r>
           </a:p>
           <a:p>
@@ -7121,25 +5887,30 @@
               </a:spcAft>
             </a:pPr>
             <a:r>
-              <a:rPr lang="en-US" sz="1100" dirty="0">
+              <a:rPr lang="en-US" sz="1100" kern="1200" dirty="0" smtClean="0">
                 <a:solidFill>
                   <a:schemeClr val="tx1"/>
                 </a:solidFill>
               </a:rPr>
-              <a:t>(144)</a:t>
-            </a:r>
-          </a:p>
-        </p:txBody>
-      </p:sp>
-      <p:sp>
-        <p:nvSpPr>
-          <p:cNvPr id="76" name="Freeform 75"/>
+              <a:t>(78)</a:t>
+            </a:r>
+            <a:endParaRPr lang="en-US" sz="1100" kern="1200" dirty="0">
+              <a:solidFill>
+                <a:schemeClr val="tx1"/>
+              </a:solidFill>
+            </a:endParaRPr>
+          </a:p>
+        </p:txBody>
+      </p:sp>
+      <p:sp>
+        <p:nvSpPr>
+          <p:cNvPr id="74" name="Freeform 73"/>
           <p:cNvSpPr/>
           <p:nvPr/>
         </p:nvSpPr>
         <p:spPr>
           <a:xfrm>
-            <a:off x="7345577" y="4360465"/>
+            <a:off x="6042087" y="4353792"/>
             <a:ext cx="928330" cy="464165"/>
           </a:xfrm>
           <a:custGeom>
@@ -7257,13 +6028,13 @@
       </p:sp>
       <p:sp>
         <p:nvSpPr>
-          <p:cNvPr id="77" name="Freeform 76"/>
+          <p:cNvPr id="75" name="Freeform 74"/>
           <p:cNvSpPr/>
           <p:nvPr/>
         </p:nvSpPr>
         <p:spPr>
           <a:xfrm>
-            <a:off x="7345577" y="5019579"/>
+            <a:off x="7113495" y="3701350"/>
             <a:ext cx="928330" cy="464165"/>
           </a:xfrm>
           <a:custGeom>
@@ -7364,30 +6135,449 @@
               </a:spcAft>
             </a:pPr>
             <a:r>
-              <a:rPr lang="en-US" sz="1100" kern="1200" dirty="0" smtClean="0">
+              <a:rPr lang="en-US" sz="1100" dirty="0" smtClean="0">
                 <a:solidFill>
                   <a:schemeClr val="tx1"/>
                 </a:solidFill>
               </a:rPr>
-              <a:t>Plot per main class</a:t>
-            </a:r>
-            <a:endParaRPr lang="en-US" sz="1100" kern="1200" dirty="0">
+              <a:t>Stranded </a:t>
+            </a:r>
+            <a:r>
+              <a:rPr lang="en-US" sz="1100" dirty="0">
+                <a:solidFill>
+                  <a:schemeClr val="tx1"/>
+                </a:solidFill>
+              </a:rPr>
+              <a:t>DNS catalog</a:t>
+            </a:r>
+          </a:p>
+          <a:p>
+            <a:pPr lvl="0" algn="ctr" defTabSz="533400">
+              <a:lnSpc>
+                <a:spcPct val="90000"/>
+              </a:lnSpc>
+              <a:spcBef>
+                <a:spcPct val="0"/>
+              </a:spcBef>
+              <a:spcAft>
+                <a:spcPts val="0"/>
+              </a:spcAft>
+            </a:pPr>
+            <a:r>
+              <a:rPr lang="en-US" sz="1100" dirty="0">
+                <a:solidFill>
+                  <a:schemeClr val="tx1"/>
+                </a:solidFill>
+              </a:rPr>
+              <a:t>(144)</a:t>
+            </a:r>
+          </a:p>
+        </p:txBody>
+      </p:sp>
+      <p:grpSp>
+        <p:nvGrpSpPr>
+          <p:cNvPr id="27" name="Group 26"/>
+          <p:cNvGrpSpPr/>
+          <p:nvPr/>
+        </p:nvGrpSpPr>
+        <p:grpSpPr>
+          <a:xfrm>
+            <a:off x="7105296" y="4360465"/>
+            <a:ext cx="928330" cy="1395274"/>
+            <a:chOff x="7338902" y="4360465"/>
+            <a:chExt cx="928330" cy="1395274"/>
+          </a:xfrm>
+        </p:grpSpPr>
+        <p:sp>
+          <p:nvSpPr>
+            <p:cNvPr id="76" name="Freeform 75"/>
+            <p:cNvSpPr/>
+            <p:nvPr/>
+          </p:nvSpPr>
+          <p:spPr>
+            <a:xfrm>
+              <a:off x="7338902" y="4360465"/>
+              <a:ext cx="928330" cy="464165"/>
+            </a:xfrm>
+            <a:custGeom>
+              <a:avLst/>
+              <a:gdLst>
+                <a:gd name="connsiteX0" fmla="*/ 0 w 928330"/>
+                <a:gd name="connsiteY0" fmla="*/ 0 h 464165"/>
+                <a:gd name="connsiteX1" fmla="*/ 928330 w 928330"/>
+                <a:gd name="connsiteY1" fmla="*/ 0 h 464165"/>
+                <a:gd name="connsiteX2" fmla="*/ 928330 w 928330"/>
+                <a:gd name="connsiteY2" fmla="*/ 464165 h 464165"/>
+                <a:gd name="connsiteX3" fmla="*/ 0 w 928330"/>
+                <a:gd name="connsiteY3" fmla="*/ 464165 h 464165"/>
+                <a:gd name="connsiteX4" fmla="*/ 0 w 928330"/>
+                <a:gd name="connsiteY4" fmla="*/ 0 h 464165"/>
+              </a:gdLst>
+              <a:ahLst/>
+              <a:cxnLst>
+                <a:cxn ang="0">
+                  <a:pos x="connsiteX0" y="connsiteY0"/>
+                </a:cxn>
+                <a:cxn ang="0">
+                  <a:pos x="connsiteX1" y="connsiteY1"/>
+                </a:cxn>
+                <a:cxn ang="0">
+                  <a:pos x="connsiteX2" y="connsiteY2"/>
+                </a:cxn>
+                <a:cxn ang="0">
+                  <a:pos x="connsiteX3" y="connsiteY3"/>
+                </a:cxn>
+                <a:cxn ang="0">
+                  <a:pos x="connsiteX4" y="connsiteY4"/>
+                </a:cxn>
+              </a:cxnLst>
+              <a:rect l="l" t="t" r="r" b="b"/>
+              <a:pathLst>
+                <a:path w="928330" h="464165">
+                  <a:moveTo>
+                    <a:pt x="0" y="0"/>
+                  </a:moveTo>
+                  <a:lnTo>
+                    <a:pt x="928330" y="0"/>
+                  </a:lnTo>
+                  <a:lnTo>
+                    <a:pt x="928330" y="464165"/>
+                  </a:lnTo>
+                  <a:lnTo>
+                    <a:pt x="0" y="464165"/>
+                  </a:lnTo>
+                  <a:lnTo>
+                    <a:pt x="0" y="0"/>
+                  </a:lnTo>
+                  <a:close/>
+                </a:path>
+              </a:pathLst>
+            </a:custGeom>
+            <a:noFill/>
+            <a:ln w="19050">
               <a:solidFill>
-                <a:schemeClr val="tx1"/>
+                <a:schemeClr val="accent1"/>
               </a:solidFill>
-            </a:endParaRPr>
-          </a:p>
-        </p:txBody>
-      </p:sp>
-      <p:sp>
-        <p:nvSpPr>
-          <p:cNvPr id="78" name="Freeform 77"/>
+            </a:ln>
+          </p:spPr>
+          <p:style>
+            <a:lnRef idx="2">
+              <a:scrgbClr r="0" g="0" b="0"/>
+            </a:lnRef>
+            <a:fillRef idx="1">
+              <a:scrgbClr r="0" g="0" b="0"/>
+            </a:fillRef>
+            <a:effectRef idx="0">
+              <a:schemeClr val="accent1">
+                <a:hueOff val="0"/>
+                <a:satOff val="0"/>
+                <a:lumOff val="0"/>
+                <a:alphaOff val="0"/>
+              </a:schemeClr>
+            </a:effectRef>
+            <a:fontRef idx="minor">
+              <a:schemeClr val="lt1"/>
+            </a:fontRef>
+          </p:style>
+          <p:txBody>
+            <a:bodyPr spcFirstLastPara="0" vert="horz" wrap="square" lIns="7620" tIns="7620" rIns="7620" bIns="7620" numCol="1" spcCol="1270" anchor="ctr" anchorCtr="0">
+              <a:noAutofit/>
+            </a:bodyPr>
+            <a:lstStyle/>
+            <a:p>
+              <a:pPr lvl="0" algn="ctr" defTabSz="533400">
+                <a:lnSpc>
+                  <a:spcPct val="90000"/>
+                </a:lnSpc>
+                <a:spcBef>
+                  <a:spcPct val="0"/>
+                </a:spcBef>
+                <a:spcAft>
+                  <a:spcPts val="0"/>
+                </a:spcAft>
+              </a:pPr>
+              <a:r>
+                <a:rPr lang="en-US" sz="1100" kern="1200" dirty="0" smtClean="0">
+                  <a:solidFill>
+                    <a:schemeClr val="tx1"/>
+                  </a:solidFill>
+                </a:rPr>
+                <a:t>Plot</a:t>
+              </a:r>
+              <a:endParaRPr lang="en-US" sz="1100" kern="1200" dirty="0">
+                <a:solidFill>
+                  <a:schemeClr val="tx1"/>
+                </a:solidFill>
+              </a:endParaRPr>
+            </a:p>
+          </p:txBody>
+        </p:sp>
+        <p:sp>
+          <p:nvSpPr>
+            <p:cNvPr id="77" name="Freeform 76"/>
+            <p:cNvSpPr/>
+            <p:nvPr/>
+          </p:nvSpPr>
+          <p:spPr>
+            <a:xfrm>
+              <a:off x="7338902" y="4826020"/>
+              <a:ext cx="928330" cy="464165"/>
+            </a:xfrm>
+            <a:custGeom>
+              <a:avLst/>
+              <a:gdLst>
+                <a:gd name="connsiteX0" fmla="*/ 0 w 928330"/>
+                <a:gd name="connsiteY0" fmla="*/ 0 h 464165"/>
+                <a:gd name="connsiteX1" fmla="*/ 928330 w 928330"/>
+                <a:gd name="connsiteY1" fmla="*/ 0 h 464165"/>
+                <a:gd name="connsiteX2" fmla="*/ 928330 w 928330"/>
+                <a:gd name="connsiteY2" fmla="*/ 464165 h 464165"/>
+                <a:gd name="connsiteX3" fmla="*/ 0 w 928330"/>
+                <a:gd name="connsiteY3" fmla="*/ 464165 h 464165"/>
+                <a:gd name="connsiteX4" fmla="*/ 0 w 928330"/>
+                <a:gd name="connsiteY4" fmla="*/ 0 h 464165"/>
+              </a:gdLst>
+              <a:ahLst/>
+              <a:cxnLst>
+                <a:cxn ang="0">
+                  <a:pos x="connsiteX0" y="connsiteY0"/>
+                </a:cxn>
+                <a:cxn ang="0">
+                  <a:pos x="connsiteX1" y="connsiteY1"/>
+                </a:cxn>
+                <a:cxn ang="0">
+                  <a:pos x="connsiteX2" y="connsiteY2"/>
+                </a:cxn>
+                <a:cxn ang="0">
+                  <a:pos x="connsiteX3" y="connsiteY3"/>
+                </a:cxn>
+                <a:cxn ang="0">
+                  <a:pos x="connsiteX4" y="connsiteY4"/>
+                </a:cxn>
+              </a:cxnLst>
+              <a:rect l="l" t="t" r="r" b="b"/>
+              <a:pathLst>
+                <a:path w="928330" h="464165">
+                  <a:moveTo>
+                    <a:pt x="0" y="0"/>
+                  </a:moveTo>
+                  <a:lnTo>
+                    <a:pt x="928330" y="0"/>
+                  </a:lnTo>
+                  <a:lnTo>
+                    <a:pt x="928330" y="464165"/>
+                  </a:lnTo>
+                  <a:lnTo>
+                    <a:pt x="0" y="464165"/>
+                  </a:lnTo>
+                  <a:lnTo>
+                    <a:pt x="0" y="0"/>
+                  </a:lnTo>
+                  <a:close/>
+                </a:path>
+              </a:pathLst>
+            </a:custGeom>
+            <a:noFill/>
+            <a:ln w="19050">
+              <a:solidFill>
+                <a:schemeClr val="accent1"/>
+              </a:solidFill>
+            </a:ln>
+          </p:spPr>
+          <p:style>
+            <a:lnRef idx="2">
+              <a:scrgbClr r="0" g="0" b="0"/>
+            </a:lnRef>
+            <a:fillRef idx="1">
+              <a:scrgbClr r="0" g="0" b="0"/>
+            </a:fillRef>
+            <a:effectRef idx="0">
+              <a:schemeClr val="accent1">
+                <a:hueOff val="0"/>
+                <a:satOff val="0"/>
+                <a:lumOff val="0"/>
+                <a:alphaOff val="0"/>
+              </a:schemeClr>
+            </a:effectRef>
+            <a:fontRef idx="minor">
+              <a:schemeClr val="lt1"/>
+            </a:fontRef>
+          </p:style>
+          <p:txBody>
+            <a:bodyPr spcFirstLastPara="0" vert="horz" wrap="square" lIns="7620" tIns="7620" rIns="7620" bIns="7620" numCol="1" spcCol="1270" anchor="ctr" anchorCtr="0">
+              <a:noAutofit/>
+            </a:bodyPr>
+            <a:lstStyle/>
+            <a:p>
+              <a:pPr lvl="0" algn="ctr" defTabSz="533400">
+                <a:lnSpc>
+                  <a:spcPct val="90000"/>
+                </a:lnSpc>
+                <a:spcBef>
+                  <a:spcPct val="0"/>
+                </a:spcBef>
+                <a:spcAft>
+                  <a:spcPts val="0"/>
+                </a:spcAft>
+              </a:pPr>
+              <a:r>
+                <a:rPr lang="en-US" sz="1100" kern="1200" dirty="0" smtClean="0">
+                  <a:solidFill>
+                    <a:schemeClr val="tx1"/>
+                  </a:solidFill>
+                </a:rPr>
+                <a:t>Plot per main class</a:t>
+              </a:r>
+              <a:endParaRPr lang="en-US" sz="1100" kern="1200" dirty="0">
+                <a:solidFill>
+                  <a:schemeClr val="tx1"/>
+                </a:solidFill>
+              </a:endParaRPr>
+            </a:p>
+          </p:txBody>
+        </p:sp>
+        <p:sp>
+          <p:nvSpPr>
+            <p:cNvPr id="78" name="Freeform 77"/>
+            <p:cNvSpPr/>
+            <p:nvPr/>
+          </p:nvSpPr>
+          <p:spPr>
+            <a:xfrm>
+              <a:off x="7338902" y="5291574"/>
+              <a:ext cx="928330" cy="464165"/>
+            </a:xfrm>
+            <a:custGeom>
+              <a:avLst/>
+              <a:gdLst>
+                <a:gd name="connsiteX0" fmla="*/ 0 w 928330"/>
+                <a:gd name="connsiteY0" fmla="*/ 0 h 464165"/>
+                <a:gd name="connsiteX1" fmla="*/ 928330 w 928330"/>
+                <a:gd name="connsiteY1" fmla="*/ 0 h 464165"/>
+                <a:gd name="connsiteX2" fmla="*/ 928330 w 928330"/>
+                <a:gd name="connsiteY2" fmla="*/ 464165 h 464165"/>
+                <a:gd name="connsiteX3" fmla="*/ 0 w 928330"/>
+                <a:gd name="connsiteY3" fmla="*/ 464165 h 464165"/>
+                <a:gd name="connsiteX4" fmla="*/ 0 w 928330"/>
+                <a:gd name="connsiteY4" fmla="*/ 0 h 464165"/>
+              </a:gdLst>
+              <a:ahLst/>
+              <a:cxnLst>
+                <a:cxn ang="0">
+                  <a:pos x="connsiteX0" y="connsiteY0"/>
+                </a:cxn>
+                <a:cxn ang="0">
+                  <a:pos x="connsiteX1" y="connsiteY1"/>
+                </a:cxn>
+                <a:cxn ang="0">
+                  <a:pos x="connsiteX2" y="connsiteY2"/>
+                </a:cxn>
+                <a:cxn ang="0">
+                  <a:pos x="connsiteX3" y="connsiteY3"/>
+                </a:cxn>
+                <a:cxn ang="0">
+                  <a:pos x="connsiteX4" y="connsiteY4"/>
+                </a:cxn>
+              </a:cxnLst>
+              <a:rect l="l" t="t" r="r" b="b"/>
+              <a:pathLst>
+                <a:path w="928330" h="464165">
+                  <a:moveTo>
+                    <a:pt x="0" y="0"/>
+                  </a:moveTo>
+                  <a:lnTo>
+                    <a:pt x="928330" y="0"/>
+                  </a:lnTo>
+                  <a:lnTo>
+                    <a:pt x="928330" y="464165"/>
+                  </a:lnTo>
+                  <a:lnTo>
+                    <a:pt x="0" y="464165"/>
+                  </a:lnTo>
+                  <a:lnTo>
+                    <a:pt x="0" y="0"/>
+                  </a:lnTo>
+                  <a:close/>
+                </a:path>
+              </a:pathLst>
+            </a:custGeom>
+            <a:noFill/>
+            <a:ln w="19050">
+              <a:solidFill>
+                <a:schemeClr val="accent1"/>
+              </a:solidFill>
+            </a:ln>
+          </p:spPr>
+          <p:style>
+            <a:lnRef idx="2">
+              <a:scrgbClr r="0" g="0" b="0"/>
+            </a:lnRef>
+            <a:fillRef idx="1">
+              <a:scrgbClr r="0" g="0" b="0"/>
+            </a:fillRef>
+            <a:effectRef idx="0">
+              <a:schemeClr val="accent1">
+                <a:hueOff val="0"/>
+                <a:satOff val="0"/>
+                <a:lumOff val="0"/>
+                <a:alphaOff val="0"/>
+              </a:schemeClr>
+            </a:effectRef>
+            <a:fontRef idx="minor">
+              <a:schemeClr val="lt1"/>
+            </a:fontRef>
+          </p:style>
+          <p:txBody>
+            <a:bodyPr spcFirstLastPara="0" vert="horz" wrap="square" lIns="7620" tIns="7620" rIns="7620" bIns="7620" numCol="1" spcCol="1270" anchor="ctr" anchorCtr="0">
+              <a:noAutofit/>
+            </a:bodyPr>
+            <a:lstStyle/>
+            <a:p>
+              <a:pPr lvl="0" algn="ctr" defTabSz="533400">
+                <a:lnSpc>
+                  <a:spcPct val="90000"/>
+                </a:lnSpc>
+                <a:spcBef>
+                  <a:spcPct val="0"/>
+                </a:spcBef>
+                <a:spcAft>
+                  <a:spcPts val="0"/>
+                </a:spcAft>
+              </a:pPr>
+              <a:r>
+                <a:rPr lang="en-US" sz="1100" kern="1200" dirty="0" err="1" smtClean="0">
+                  <a:solidFill>
+                    <a:schemeClr val="tx1"/>
+                  </a:solidFill>
+                </a:rPr>
+                <a:t>Binom.test</a:t>
+              </a:r>
+              <a:r>
+                <a:rPr lang="en-US" sz="1100" kern="1200" dirty="0" smtClean="0">
+                  <a:solidFill>
+                    <a:schemeClr val="tx1"/>
+                  </a:solidFill>
+                </a:rPr>
+                <a:t> per min class</a:t>
+              </a:r>
+              <a:endParaRPr lang="en-US" sz="1100" kern="1200" dirty="0">
+                <a:solidFill>
+                  <a:schemeClr val="tx1"/>
+                </a:solidFill>
+              </a:endParaRPr>
+            </a:p>
+          </p:txBody>
+        </p:sp>
+      </p:grpSp>
+      <p:sp>
+        <p:nvSpPr>
+          <p:cNvPr id="79" name="Freeform 78"/>
           <p:cNvSpPr/>
           <p:nvPr/>
         </p:nvSpPr>
         <p:spPr>
           <a:xfrm>
-            <a:off x="7345577" y="5678693"/>
+            <a:off x="8394429" y="3695379"/>
             <a:ext cx="928330" cy="464165"/>
           </a:xfrm>
           <a:custGeom>
@@ -7488,12 +6678,41 @@
               </a:spcAft>
             </a:pPr>
             <a:r>
+              <a:rPr lang="en-US" sz="1100" kern="1200" dirty="0" smtClean="0">
+                <a:solidFill>
+                  <a:schemeClr val="tx1"/>
+                </a:solidFill>
+              </a:rPr>
+              <a:t>Quad catalog</a:t>
+            </a:r>
+          </a:p>
+          <a:p>
+            <a:pPr lvl="0" algn="ctr" defTabSz="533400">
+              <a:lnSpc>
+                <a:spcPct val="90000"/>
+              </a:lnSpc>
+              <a:spcBef>
+                <a:spcPct val="0"/>
+              </a:spcBef>
+              <a:spcAft>
+                <a:spcPts val="0"/>
+              </a:spcAft>
+            </a:pPr>
+            <a:r>
+              <a:rPr lang="en-US" sz="1100" kern="1200" dirty="0" smtClean="0">
+                <a:solidFill>
+                  <a:schemeClr val="tx1"/>
+                </a:solidFill>
+              </a:rPr>
+              <a:t>(</a:t>
+            </a:r>
+            <a:r>
               <a:rPr lang="en-US" sz="1100" kern="1200" dirty="0" err="1" smtClean="0">
                 <a:solidFill>
                   <a:schemeClr val="tx1"/>
                 </a:solidFill>
               </a:rPr>
-              <a:t>Binom.test</a:t>
+              <a:t>unstranded</a:t>
             </a:r>
             <a:r>
               <a:rPr lang="en-US" sz="1100" kern="1200" dirty="0" smtClean="0">
@@ -7501,7 +6720,23 @@
                   <a:schemeClr val="tx1"/>
                 </a:solidFill>
               </a:rPr>
-              <a:t> per min class</a:t>
+              <a:t> +1/-1 </a:t>
+            </a:r>
+            <a:r>
+              <a:rPr lang="en-US" sz="1100" dirty="0" smtClean="0">
+                <a:solidFill>
+                  <a:schemeClr val="tx1"/>
+                </a:solidFill>
+              </a:rPr>
+              <a:t>136</a:t>
+            </a:r>
+            <a:r>
+              <a:rPr lang="en-US" sz="1100" kern="1200" dirty="0" smtClean="0">
+                <a:solidFill>
+                  <a:schemeClr val="tx1"/>
+                </a:solidFill>
+              </a:rPr>
+              <a:t>)</a:t>
             </a:r>
             <a:endParaRPr lang="en-US" sz="1100" kern="1200" dirty="0">
               <a:solidFill>
@@ -7513,13 +6748,13 @@
       </p:sp>
       <p:sp>
         <p:nvSpPr>
-          <p:cNvPr id="79" name="Freeform 78"/>
+          <p:cNvPr id="81" name="Freeform 80"/>
           <p:cNvSpPr/>
           <p:nvPr/>
         </p:nvSpPr>
         <p:spPr>
           <a:xfrm>
-            <a:off x="8394429" y="3695379"/>
+            <a:off x="8424963" y="4721560"/>
             <a:ext cx="928330" cy="464165"/>
           </a:xfrm>
           <a:custGeom>
@@ -7625,60 +6860,7 @@
                   <a:schemeClr val="tx1"/>
                 </a:solidFill>
               </a:rPr>
-              <a:t>Quad catalog</a:t>
-            </a:r>
-          </a:p>
-          <a:p>
-            <a:pPr lvl="0" algn="ctr" defTabSz="533400">
-              <a:lnSpc>
-                <a:spcPct val="90000"/>
-              </a:lnSpc>
-              <a:spcBef>
-                <a:spcPct val="0"/>
-              </a:spcBef>
-              <a:spcAft>
-                <a:spcPts val="0"/>
-              </a:spcAft>
-            </a:pPr>
-            <a:r>
-              <a:rPr lang="en-US" sz="1100" kern="1200" dirty="0" smtClean="0">
-                <a:solidFill>
-                  <a:schemeClr val="tx1"/>
-                </a:solidFill>
-              </a:rPr>
-              <a:t>(</a:t>
-            </a:r>
-            <a:r>
-              <a:rPr lang="en-US" sz="1100" kern="1200" dirty="0" err="1" smtClean="0">
-                <a:solidFill>
-                  <a:schemeClr val="tx1"/>
-                </a:solidFill>
-              </a:rPr>
-              <a:t>unstranded</a:t>
-            </a:r>
-            <a:r>
-              <a:rPr lang="en-US" sz="1100" kern="1200" dirty="0" smtClean="0">
-                <a:solidFill>
-                  <a:schemeClr val="tx1"/>
-                </a:solidFill>
-              </a:rPr>
-              <a:t> +1/-1 </a:t>
-            </a:r>
-            <a:r>
-              <a:rPr lang="en-US" sz="1100" dirty="0" smtClean="0">
-                <a:solidFill>
-                  <a:schemeClr val="tx1"/>
-                </a:solidFill>
-              </a:rPr>
-              <a:t>136</a:t>
-            </a:r>
-            <a:r>
-              <a:rPr lang="en-US" sz="1100" kern="1200" dirty="0" smtClean="0">
-                <a:solidFill>
-                  <a:schemeClr val="tx1"/>
-                </a:solidFill>
-              </a:rPr>
-              <a:t>)</a:t>
+              <a:t>Plot</a:t>
             </a:r>
             <a:endParaRPr lang="en-US" sz="1100" kern="1200" dirty="0">
               <a:solidFill>
@@ -7688,16 +6870,295 @@
           </a:p>
         </p:txBody>
       </p:sp>
-      <p:sp>
-        <p:nvSpPr>
-          <p:cNvPr id="80" name="Freeform 79"/>
+      <p:grpSp>
+        <p:nvGrpSpPr>
+          <p:cNvPr id="6" name="Group 5"/>
+          <p:cNvGrpSpPr/>
+          <p:nvPr/>
+        </p:nvGrpSpPr>
+        <p:grpSpPr>
+          <a:xfrm>
+            <a:off x="8411109" y="4242868"/>
+            <a:ext cx="928330" cy="1395064"/>
+            <a:chOff x="8424458" y="4262891"/>
+            <a:chExt cx="928330" cy="1395064"/>
+          </a:xfrm>
+        </p:grpSpPr>
+        <p:sp>
+          <p:nvSpPr>
+            <p:cNvPr id="80" name="Freeform 79"/>
+            <p:cNvSpPr/>
+            <p:nvPr/>
+          </p:nvSpPr>
+          <p:spPr>
+            <a:xfrm>
+              <a:off x="8424458" y="4262891"/>
+              <a:ext cx="928330" cy="464165"/>
+            </a:xfrm>
+            <a:custGeom>
+              <a:avLst/>
+              <a:gdLst>
+                <a:gd name="connsiteX0" fmla="*/ 0 w 928330"/>
+                <a:gd name="connsiteY0" fmla="*/ 0 h 464165"/>
+                <a:gd name="connsiteX1" fmla="*/ 928330 w 928330"/>
+                <a:gd name="connsiteY1" fmla="*/ 0 h 464165"/>
+                <a:gd name="connsiteX2" fmla="*/ 928330 w 928330"/>
+                <a:gd name="connsiteY2" fmla="*/ 464165 h 464165"/>
+                <a:gd name="connsiteX3" fmla="*/ 0 w 928330"/>
+                <a:gd name="connsiteY3" fmla="*/ 464165 h 464165"/>
+                <a:gd name="connsiteX4" fmla="*/ 0 w 928330"/>
+                <a:gd name="connsiteY4" fmla="*/ 0 h 464165"/>
+              </a:gdLst>
+              <a:ahLst/>
+              <a:cxnLst>
+                <a:cxn ang="0">
+                  <a:pos x="connsiteX0" y="connsiteY0"/>
+                </a:cxn>
+                <a:cxn ang="0">
+                  <a:pos x="connsiteX1" y="connsiteY1"/>
+                </a:cxn>
+                <a:cxn ang="0">
+                  <a:pos x="connsiteX2" y="connsiteY2"/>
+                </a:cxn>
+                <a:cxn ang="0">
+                  <a:pos x="connsiteX3" y="connsiteY3"/>
+                </a:cxn>
+                <a:cxn ang="0">
+                  <a:pos x="connsiteX4" y="connsiteY4"/>
+                </a:cxn>
+              </a:cxnLst>
+              <a:rect l="l" t="t" r="r" b="b"/>
+              <a:pathLst>
+                <a:path w="928330" h="464165">
+                  <a:moveTo>
+                    <a:pt x="0" y="0"/>
+                  </a:moveTo>
+                  <a:lnTo>
+                    <a:pt x="928330" y="0"/>
+                  </a:lnTo>
+                  <a:lnTo>
+                    <a:pt x="928330" y="464165"/>
+                  </a:lnTo>
+                  <a:lnTo>
+                    <a:pt x="0" y="464165"/>
+                  </a:lnTo>
+                  <a:lnTo>
+                    <a:pt x="0" y="0"/>
+                  </a:lnTo>
+                  <a:close/>
+                </a:path>
+              </a:pathLst>
+            </a:custGeom>
+            <a:noFill/>
+            <a:ln w="19050">
+              <a:solidFill>
+                <a:schemeClr val="accent1"/>
+              </a:solidFill>
+            </a:ln>
+          </p:spPr>
+          <p:style>
+            <a:lnRef idx="2">
+              <a:scrgbClr r="0" g="0" b="0"/>
+            </a:lnRef>
+            <a:fillRef idx="1">
+              <a:scrgbClr r="0" g="0" b="0"/>
+            </a:fillRef>
+            <a:effectRef idx="0">
+              <a:schemeClr val="accent1">
+                <a:hueOff val="0"/>
+                <a:satOff val="0"/>
+                <a:lumOff val="0"/>
+                <a:alphaOff val="0"/>
+              </a:schemeClr>
+            </a:effectRef>
+            <a:fontRef idx="minor">
+              <a:schemeClr val="lt1"/>
+            </a:fontRef>
+          </p:style>
+          <p:txBody>
+            <a:bodyPr spcFirstLastPara="0" vert="horz" wrap="square" lIns="7620" tIns="7620" rIns="7620" bIns="7620" numCol="1" spcCol="1270" anchor="ctr" anchorCtr="0">
+              <a:noAutofit/>
+            </a:bodyPr>
+            <a:lstStyle/>
+            <a:p>
+              <a:pPr lvl="0" algn="ctr" defTabSz="533400">
+                <a:lnSpc>
+                  <a:spcPct val="90000"/>
+                </a:lnSpc>
+                <a:spcBef>
+                  <a:spcPct val="0"/>
+                </a:spcBef>
+                <a:spcAft>
+                  <a:spcPts val="0"/>
+                </a:spcAft>
+              </a:pPr>
+              <a:r>
+                <a:rPr lang="en-US" sz="1100" kern="1200" dirty="0" err="1" smtClean="0">
+                  <a:solidFill>
+                    <a:schemeClr val="tx1"/>
+                  </a:solidFill>
+                </a:rPr>
+                <a:t>Dinuc</a:t>
+              </a:r>
+              <a:r>
+                <a:rPr lang="en-US" sz="1100" kern="1200" dirty="0" smtClean="0">
+                  <a:solidFill>
+                    <a:schemeClr val="tx1"/>
+                  </a:solidFill>
+                </a:rPr>
+                <a:t> seq. context analysis</a:t>
+              </a:r>
+              <a:endParaRPr lang="en-US" sz="1100" kern="1200" dirty="0">
+                <a:solidFill>
+                  <a:schemeClr val="tx1"/>
+                </a:solidFill>
+              </a:endParaRPr>
+            </a:p>
+          </p:txBody>
+        </p:sp>
+        <p:sp>
+          <p:nvSpPr>
+            <p:cNvPr id="82" name="Freeform 81"/>
+            <p:cNvSpPr/>
+            <p:nvPr/>
+          </p:nvSpPr>
+          <p:spPr>
+            <a:xfrm>
+              <a:off x="8424458" y="5193790"/>
+              <a:ext cx="928330" cy="464165"/>
+            </a:xfrm>
+            <a:custGeom>
+              <a:avLst/>
+              <a:gdLst>
+                <a:gd name="connsiteX0" fmla="*/ 0 w 928330"/>
+                <a:gd name="connsiteY0" fmla="*/ 0 h 464165"/>
+                <a:gd name="connsiteX1" fmla="*/ 928330 w 928330"/>
+                <a:gd name="connsiteY1" fmla="*/ 0 h 464165"/>
+                <a:gd name="connsiteX2" fmla="*/ 928330 w 928330"/>
+                <a:gd name="connsiteY2" fmla="*/ 464165 h 464165"/>
+                <a:gd name="connsiteX3" fmla="*/ 0 w 928330"/>
+                <a:gd name="connsiteY3" fmla="*/ 464165 h 464165"/>
+                <a:gd name="connsiteX4" fmla="*/ 0 w 928330"/>
+                <a:gd name="connsiteY4" fmla="*/ 0 h 464165"/>
+              </a:gdLst>
+              <a:ahLst/>
+              <a:cxnLst>
+                <a:cxn ang="0">
+                  <a:pos x="connsiteX0" y="connsiteY0"/>
+                </a:cxn>
+                <a:cxn ang="0">
+                  <a:pos x="connsiteX1" y="connsiteY1"/>
+                </a:cxn>
+                <a:cxn ang="0">
+                  <a:pos x="connsiteX2" y="connsiteY2"/>
+                </a:cxn>
+                <a:cxn ang="0">
+                  <a:pos x="connsiteX3" y="connsiteY3"/>
+                </a:cxn>
+                <a:cxn ang="0">
+                  <a:pos x="connsiteX4" y="connsiteY4"/>
+                </a:cxn>
+              </a:cxnLst>
+              <a:rect l="l" t="t" r="r" b="b"/>
+              <a:pathLst>
+                <a:path w="928330" h="464165">
+                  <a:moveTo>
+                    <a:pt x="0" y="0"/>
+                  </a:moveTo>
+                  <a:lnTo>
+                    <a:pt x="928330" y="0"/>
+                  </a:lnTo>
+                  <a:lnTo>
+                    <a:pt x="928330" y="464165"/>
+                  </a:lnTo>
+                  <a:lnTo>
+                    <a:pt x="0" y="464165"/>
+                  </a:lnTo>
+                  <a:lnTo>
+                    <a:pt x="0" y="0"/>
+                  </a:lnTo>
+                  <a:close/>
+                </a:path>
+              </a:pathLst>
+            </a:custGeom>
+            <a:noFill/>
+            <a:ln w="19050">
+              <a:solidFill>
+                <a:schemeClr val="accent1"/>
+              </a:solidFill>
+            </a:ln>
+          </p:spPr>
+          <p:style>
+            <a:lnRef idx="2">
+              <a:scrgbClr r="0" g="0" b="0"/>
+            </a:lnRef>
+            <a:fillRef idx="1">
+              <a:scrgbClr r="0" g="0" b="0"/>
+            </a:fillRef>
+            <a:effectRef idx="0">
+              <a:schemeClr val="accent1">
+                <a:hueOff val="0"/>
+                <a:satOff val="0"/>
+                <a:lumOff val="0"/>
+                <a:alphaOff val="0"/>
+              </a:schemeClr>
+            </a:effectRef>
+            <a:fontRef idx="minor">
+              <a:schemeClr val="lt1"/>
+            </a:fontRef>
+          </p:style>
+          <p:txBody>
+            <a:bodyPr spcFirstLastPara="0" vert="horz" wrap="square" lIns="7620" tIns="7620" rIns="7620" bIns="7620" numCol="1" spcCol="1270" anchor="ctr" anchorCtr="0">
+              <a:noAutofit/>
+            </a:bodyPr>
+            <a:lstStyle/>
+            <a:p>
+              <a:pPr lvl="0" algn="ctr" defTabSz="533400">
+                <a:lnSpc>
+                  <a:spcPct val="90000"/>
+                </a:lnSpc>
+                <a:spcBef>
+                  <a:spcPct val="0"/>
+                </a:spcBef>
+                <a:spcAft>
+                  <a:spcPts val="0"/>
+                </a:spcAft>
+              </a:pPr>
+              <a:r>
+                <a:rPr lang="en-US" sz="1100" kern="1200" dirty="0" err="1" smtClean="0">
+                  <a:solidFill>
+                    <a:schemeClr val="tx1"/>
+                  </a:solidFill>
+                </a:rPr>
+                <a:t>Binom.test</a:t>
+              </a:r>
+              <a:r>
+                <a:rPr lang="en-US" sz="1100" kern="1200" dirty="0" smtClean="0">
+                  <a:solidFill>
+                    <a:schemeClr val="tx1"/>
+                  </a:solidFill>
+                </a:rPr>
+                <a:t> for enrichment</a:t>
+              </a:r>
+              <a:endParaRPr lang="en-US" sz="1100" kern="1200" dirty="0">
+                <a:solidFill>
+                  <a:schemeClr val="tx1"/>
+                </a:solidFill>
+              </a:endParaRPr>
+            </a:p>
+          </p:txBody>
+        </p:sp>
+      </p:grpSp>
+      <p:sp>
+        <p:nvSpPr>
+          <p:cNvPr id="83" name="Freeform 82"/>
           <p:cNvSpPr/>
           <p:nvPr/>
         </p:nvSpPr>
         <p:spPr>
           <a:xfrm>
-            <a:off x="8493526" y="4322961"/>
-            <a:ext cx="928330" cy="464165"/>
+            <a:off x="8706250" y="1204408"/>
+            <a:ext cx="1694487" cy="464165"/>
           </a:xfrm>
           <a:custGeom>
             <a:avLst/>
@@ -7757,394 +7218,6 @@
           <a:ln w="19050">
             <a:solidFill>
               <a:schemeClr val="accent1"/>
-            </a:solidFill>
-          </a:ln>
-        </p:spPr>
-        <p:style>
-          <a:lnRef idx="2">
-            <a:scrgbClr r="0" g="0" b="0"/>
-          </a:lnRef>
-          <a:fillRef idx="1">
-            <a:scrgbClr r="0" g="0" b="0"/>
-          </a:fillRef>
-          <a:effectRef idx="0">
-            <a:schemeClr val="accent1">
-              <a:hueOff val="0"/>
-              <a:satOff val="0"/>
-              <a:lumOff val="0"/>
-              <a:alphaOff val="0"/>
-            </a:schemeClr>
-          </a:effectRef>
-          <a:fontRef idx="minor">
-            <a:schemeClr val="lt1"/>
-          </a:fontRef>
-        </p:style>
-        <p:txBody>
-          <a:bodyPr spcFirstLastPara="0" vert="horz" wrap="square" lIns="7620" tIns="7620" rIns="7620" bIns="7620" numCol="1" spcCol="1270" anchor="ctr" anchorCtr="0">
-            <a:noAutofit/>
-          </a:bodyPr>
-          <a:lstStyle/>
-          <a:p>
-            <a:pPr lvl="0" algn="ctr" defTabSz="533400">
-              <a:lnSpc>
-                <a:spcPct val="90000"/>
-              </a:lnSpc>
-              <a:spcBef>
-                <a:spcPct val="0"/>
-              </a:spcBef>
-              <a:spcAft>
-                <a:spcPts val="0"/>
-              </a:spcAft>
-            </a:pPr>
-            <a:r>
-              <a:rPr lang="en-US" sz="1100" kern="1200" dirty="0" err="1" smtClean="0">
-                <a:solidFill>
-                  <a:schemeClr val="tx1"/>
-                </a:solidFill>
-              </a:rPr>
-              <a:t>Dinuc</a:t>
-            </a:r>
-            <a:r>
-              <a:rPr lang="en-US" sz="1100" kern="1200" dirty="0" smtClean="0">
-                <a:solidFill>
-                  <a:schemeClr val="tx1"/>
-                </a:solidFill>
-              </a:rPr>
-              <a:t> seq. context analysis</a:t>
-            </a:r>
-            <a:endParaRPr lang="en-US" sz="1100" kern="1200" dirty="0">
-              <a:solidFill>
-                <a:schemeClr val="tx1"/>
-              </a:solidFill>
-            </a:endParaRPr>
-          </a:p>
-        </p:txBody>
-      </p:sp>
-      <p:sp>
-        <p:nvSpPr>
-          <p:cNvPr id="81" name="Freeform 80"/>
-          <p:cNvSpPr/>
-          <p:nvPr/>
-        </p:nvSpPr>
-        <p:spPr>
-          <a:xfrm>
-            <a:off x="8518405" y="5001887"/>
-            <a:ext cx="928330" cy="464165"/>
-          </a:xfrm>
-          <a:custGeom>
-            <a:avLst/>
-            <a:gdLst>
-              <a:gd name="connsiteX0" fmla="*/ 0 w 928330"/>
-              <a:gd name="connsiteY0" fmla="*/ 0 h 464165"/>
-              <a:gd name="connsiteX1" fmla="*/ 928330 w 928330"/>
-              <a:gd name="connsiteY1" fmla="*/ 0 h 464165"/>
-              <a:gd name="connsiteX2" fmla="*/ 928330 w 928330"/>
-              <a:gd name="connsiteY2" fmla="*/ 464165 h 464165"/>
-              <a:gd name="connsiteX3" fmla="*/ 0 w 928330"/>
-              <a:gd name="connsiteY3" fmla="*/ 464165 h 464165"/>
-              <a:gd name="connsiteX4" fmla="*/ 0 w 928330"/>
-              <a:gd name="connsiteY4" fmla="*/ 0 h 464165"/>
-            </a:gdLst>
-            <a:ahLst/>
-            <a:cxnLst>
-              <a:cxn ang="0">
-                <a:pos x="connsiteX0" y="connsiteY0"/>
-              </a:cxn>
-              <a:cxn ang="0">
-                <a:pos x="connsiteX1" y="connsiteY1"/>
-              </a:cxn>
-              <a:cxn ang="0">
-                <a:pos x="connsiteX2" y="connsiteY2"/>
-              </a:cxn>
-              <a:cxn ang="0">
-                <a:pos x="connsiteX3" y="connsiteY3"/>
-              </a:cxn>
-              <a:cxn ang="0">
-                <a:pos x="connsiteX4" y="connsiteY4"/>
-              </a:cxn>
-            </a:cxnLst>
-            <a:rect l="l" t="t" r="r" b="b"/>
-            <a:pathLst>
-              <a:path w="928330" h="464165">
-                <a:moveTo>
-                  <a:pt x="0" y="0"/>
-                </a:moveTo>
-                <a:lnTo>
-                  <a:pt x="928330" y="0"/>
-                </a:lnTo>
-                <a:lnTo>
-                  <a:pt x="928330" y="464165"/>
-                </a:lnTo>
-                <a:lnTo>
-                  <a:pt x="0" y="464165"/>
-                </a:lnTo>
-                <a:lnTo>
-                  <a:pt x="0" y="0"/>
-                </a:lnTo>
-                <a:close/>
-              </a:path>
-            </a:pathLst>
-          </a:custGeom>
-          <a:noFill/>
-          <a:ln w="19050">
-            <a:solidFill>
-              <a:schemeClr val="accent1"/>
-            </a:solidFill>
-          </a:ln>
-        </p:spPr>
-        <p:style>
-          <a:lnRef idx="2">
-            <a:scrgbClr r="0" g="0" b="0"/>
-          </a:lnRef>
-          <a:fillRef idx="1">
-            <a:scrgbClr r="0" g="0" b="0"/>
-          </a:fillRef>
-          <a:effectRef idx="0">
-            <a:schemeClr val="accent1">
-              <a:hueOff val="0"/>
-              <a:satOff val="0"/>
-              <a:lumOff val="0"/>
-              <a:alphaOff val="0"/>
-            </a:schemeClr>
-          </a:effectRef>
-          <a:fontRef idx="minor">
-            <a:schemeClr val="lt1"/>
-          </a:fontRef>
-        </p:style>
-        <p:txBody>
-          <a:bodyPr spcFirstLastPara="0" vert="horz" wrap="square" lIns="7620" tIns="7620" rIns="7620" bIns="7620" numCol="1" spcCol="1270" anchor="ctr" anchorCtr="0">
-            <a:noAutofit/>
-          </a:bodyPr>
-          <a:lstStyle/>
-          <a:p>
-            <a:pPr lvl="0" algn="ctr" defTabSz="533400">
-              <a:lnSpc>
-                <a:spcPct val="90000"/>
-              </a:lnSpc>
-              <a:spcBef>
-                <a:spcPct val="0"/>
-              </a:spcBef>
-              <a:spcAft>
-                <a:spcPts val="0"/>
-              </a:spcAft>
-            </a:pPr>
-            <a:r>
-              <a:rPr lang="en-US" sz="1100" kern="1200" dirty="0" smtClean="0">
-                <a:solidFill>
-                  <a:schemeClr val="tx1"/>
-                </a:solidFill>
-              </a:rPr>
-              <a:t>Plot</a:t>
-            </a:r>
-            <a:endParaRPr lang="en-US" sz="1100" kern="1200" dirty="0">
-              <a:solidFill>
-                <a:schemeClr val="tx1"/>
-              </a:solidFill>
-            </a:endParaRPr>
-          </a:p>
-        </p:txBody>
-      </p:sp>
-      <p:sp>
-        <p:nvSpPr>
-          <p:cNvPr id="82" name="Freeform 81"/>
-          <p:cNvSpPr/>
-          <p:nvPr/>
-        </p:nvSpPr>
-        <p:spPr>
-          <a:xfrm>
-            <a:off x="8468856" y="5661001"/>
-            <a:ext cx="928330" cy="464165"/>
-          </a:xfrm>
-          <a:custGeom>
-            <a:avLst/>
-            <a:gdLst>
-              <a:gd name="connsiteX0" fmla="*/ 0 w 928330"/>
-              <a:gd name="connsiteY0" fmla="*/ 0 h 464165"/>
-              <a:gd name="connsiteX1" fmla="*/ 928330 w 928330"/>
-              <a:gd name="connsiteY1" fmla="*/ 0 h 464165"/>
-              <a:gd name="connsiteX2" fmla="*/ 928330 w 928330"/>
-              <a:gd name="connsiteY2" fmla="*/ 464165 h 464165"/>
-              <a:gd name="connsiteX3" fmla="*/ 0 w 928330"/>
-              <a:gd name="connsiteY3" fmla="*/ 464165 h 464165"/>
-              <a:gd name="connsiteX4" fmla="*/ 0 w 928330"/>
-              <a:gd name="connsiteY4" fmla="*/ 0 h 464165"/>
-            </a:gdLst>
-            <a:ahLst/>
-            <a:cxnLst>
-              <a:cxn ang="0">
-                <a:pos x="connsiteX0" y="connsiteY0"/>
-              </a:cxn>
-              <a:cxn ang="0">
-                <a:pos x="connsiteX1" y="connsiteY1"/>
-              </a:cxn>
-              <a:cxn ang="0">
-                <a:pos x="connsiteX2" y="connsiteY2"/>
-              </a:cxn>
-              <a:cxn ang="0">
-                <a:pos x="connsiteX3" y="connsiteY3"/>
-              </a:cxn>
-              <a:cxn ang="0">
-                <a:pos x="connsiteX4" y="connsiteY4"/>
-              </a:cxn>
-            </a:cxnLst>
-            <a:rect l="l" t="t" r="r" b="b"/>
-            <a:pathLst>
-              <a:path w="928330" h="464165">
-                <a:moveTo>
-                  <a:pt x="0" y="0"/>
-                </a:moveTo>
-                <a:lnTo>
-                  <a:pt x="928330" y="0"/>
-                </a:lnTo>
-                <a:lnTo>
-                  <a:pt x="928330" y="464165"/>
-                </a:lnTo>
-                <a:lnTo>
-                  <a:pt x="0" y="464165"/>
-                </a:lnTo>
-                <a:lnTo>
-                  <a:pt x="0" y="0"/>
-                </a:lnTo>
-                <a:close/>
-              </a:path>
-            </a:pathLst>
-          </a:custGeom>
-          <a:noFill/>
-          <a:ln w="19050">
-            <a:solidFill>
-              <a:schemeClr val="accent1"/>
-            </a:solidFill>
-          </a:ln>
-        </p:spPr>
-        <p:style>
-          <a:lnRef idx="2">
-            <a:scrgbClr r="0" g="0" b="0"/>
-          </a:lnRef>
-          <a:fillRef idx="1">
-            <a:scrgbClr r="0" g="0" b="0"/>
-          </a:fillRef>
-          <a:effectRef idx="0">
-            <a:schemeClr val="accent1">
-              <a:hueOff val="0"/>
-              <a:satOff val="0"/>
-              <a:lumOff val="0"/>
-              <a:alphaOff val="0"/>
-            </a:schemeClr>
-          </a:effectRef>
-          <a:fontRef idx="minor">
-            <a:schemeClr val="lt1"/>
-          </a:fontRef>
-        </p:style>
-        <p:txBody>
-          <a:bodyPr spcFirstLastPara="0" vert="horz" wrap="square" lIns="7620" tIns="7620" rIns="7620" bIns="7620" numCol="1" spcCol="1270" anchor="ctr" anchorCtr="0">
-            <a:noAutofit/>
-          </a:bodyPr>
-          <a:lstStyle/>
-          <a:p>
-            <a:pPr lvl="0" algn="ctr" defTabSz="533400">
-              <a:lnSpc>
-                <a:spcPct val="90000"/>
-              </a:lnSpc>
-              <a:spcBef>
-                <a:spcPct val="0"/>
-              </a:spcBef>
-              <a:spcAft>
-                <a:spcPts val="0"/>
-              </a:spcAft>
-            </a:pPr>
-            <a:r>
-              <a:rPr lang="en-US" sz="1100" kern="1200" dirty="0" err="1" smtClean="0">
-                <a:solidFill>
-                  <a:schemeClr val="tx1"/>
-                </a:solidFill>
-              </a:rPr>
-              <a:t>Binom.test</a:t>
-            </a:r>
-            <a:r>
-              <a:rPr lang="en-US" sz="1100" kern="1200" dirty="0" smtClean="0">
-                <a:solidFill>
-                  <a:schemeClr val="tx1"/>
-                </a:solidFill>
-              </a:rPr>
-              <a:t> for enrichment</a:t>
-            </a:r>
-            <a:endParaRPr lang="en-US" sz="1100" kern="1200" dirty="0">
-              <a:solidFill>
-                <a:schemeClr val="tx1"/>
-              </a:solidFill>
-            </a:endParaRPr>
-          </a:p>
-        </p:txBody>
-      </p:sp>
-      <p:sp>
-        <p:nvSpPr>
-          <p:cNvPr id="83" name="Freeform 82"/>
-          <p:cNvSpPr/>
-          <p:nvPr/>
-        </p:nvSpPr>
-        <p:spPr>
-          <a:xfrm>
-            <a:off x="8706250" y="1204408"/>
-            <a:ext cx="1694487" cy="464165"/>
-          </a:xfrm>
-          <a:custGeom>
-            <a:avLst/>
-            <a:gdLst>
-              <a:gd name="connsiteX0" fmla="*/ 0 w 928330"/>
-              <a:gd name="connsiteY0" fmla="*/ 0 h 464165"/>
-              <a:gd name="connsiteX1" fmla="*/ 928330 w 928330"/>
-              <a:gd name="connsiteY1" fmla="*/ 0 h 464165"/>
-              <a:gd name="connsiteX2" fmla="*/ 928330 w 928330"/>
-              <a:gd name="connsiteY2" fmla="*/ 464165 h 464165"/>
-              <a:gd name="connsiteX3" fmla="*/ 0 w 928330"/>
-              <a:gd name="connsiteY3" fmla="*/ 464165 h 464165"/>
-              <a:gd name="connsiteX4" fmla="*/ 0 w 928330"/>
-              <a:gd name="connsiteY4" fmla="*/ 0 h 464165"/>
-            </a:gdLst>
-            <a:ahLst/>
-            <a:cxnLst>
-              <a:cxn ang="0">
-                <a:pos x="connsiteX0" y="connsiteY0"/>
-              </a:cxn>
-              <a:cxn ang="0">
-                <a:pos x="connsiteX1" y="connsiteY1"/>
-              </a:cxn>
-              <a:cxn ang="0">
-                <a:pos x="connsiteX2" y="connsiteY2"/>
-              </a:cxn>
-              <a:cxn ang="0">
-                <a:pos x="connsiteX3" y="connsiteY3"/>
-              </a:cxn>
-              <a:cxn ang="0">
-                <a:pos x="connsiteX4" y="connsiteY4"/>
-              </a:cxn>
-            </a:cxnLst>
-            <a:rect l="l" t="t" r="r" b="b"/>
-            <a:pathLst>
-              <a:path w="928330" h="464165">
-                <a:moveTo>
-                  <a:pt x="0" y="0"/>
-                </a:moveTo>
-                <a:lnTo>
-                  <a:pt x="928330" y="0"/>
-                </a:lnTo>
-                <a:lnTo>
-                  <a:pt x="928330" y="464165"/>
-                </a:lnTo>
-                <a:lnTo>
-                  <a:pt x="0" y="464165"/>
-                </a:lnTo>
-                <a:lnTo>
-                  <a:pt x="0" y="0"/>
-                </a:lnTo>
-                <a:close/>
-              </a:path>
-            </a:pathLst>
-          </a:custGeom>
-          <a:noFill/>
-          <a:ln w="19050">
-            <a:solidFill>
-              <a:srgbClr val="00B050"/>
             </a:solidFill>
           </a:ln>
         </p:spPr>
@@ -8404,130 +7477,6 @@
             <a:endParaRPr lang="en-US" sz="1100" kern="1200" dirty="0">
               <a:solidFill>
                 <a:srgbClr val="FF0000"/>
-              </a:solidFill>
-            </a:endParaRPr>
-          </a:p>
-        </p:txBody>
-      </p:sp>
-      <p:sp>
-        <p:nvSpPr>
-          <p:cNvPr id="87" name="Freeform 86"/>
-          <p:cNvSpPr/>
-          <p:nvPr/>
-        </p:nvSpPr>
-        <p:spPr>
-          <a:xfrm>
-            <a:off x="1050443" y="1162164"/>
-            <a:ext cx="1423941" cy="566541"/>
-          </a:xfrm>
-          <a:custGeom>
-            <a:avLst/>
-            <a:gdLst>
-              <a:gd name="connsiteX0" fmla="*/ 0 w 928330"/>
-              <a:gd name="connsiteY0" fmla="*/ 0 h 464165"/>
-              <a:gd name="connsiteX1" fmla="*/ 928330 w 928330"/>
-              <a:gd name="connsiteY1" fmla="*/ 0 h 464165"/>
-              <a:gd name="connsiteX2" fmla="*/ 928330 w 928330"/>
-              <a:gd name="connsiteY2" fmla="*/ 464165 h 464165"/>
-              <a:gd name="connsiteX3" fmla="*/ 0 w 928330"/>
-              <a:gd name="connsiteY3" fmla="*/ 464165 h 464165"/>
-              <a:gd name="connsiteX4" fmla="*/ 0 w 928330"/>
-              <a:gd name="connsiteY4" fmla="*/ 0 h 464165"/>
-            </a:gdLst>
-            <a:ahLst/>
-            <a:cxnLst>
-              <a:cxn ang="0">
-                <a:pos x="connsiteX0" y="connsiteY0"/>
-              </a:cxn>
-              <a:cxn ang="0">
-                <a:pos x="connsiteX1" y="connsiteY1"/>
-              </a:cxn>
-              <a:cxn ang="0">
-                <a:pos x="connsiteX2" y="connsiteY2"/>
-              </a:cxn>
-              <a:cxn ang="0">
-                <a:pos x="connsiteX3" y="connsiteY3"/>
-              </a:cxn>
-              <a:cxn ang="0">
-                <a:pos x="connsiteX4" y="connsiteY4"/>
-              </a:cxn>
-            </a:cxnLst>
-            <a:rect l="l" t="t" r="r" b="b"/>
-            <a:pathLst>
-              <a:path w="928330" h="464165">
-                <a:moveTo>
-                  <a:pt x="0" y="0"/>
-                </a:moveTo>
-                <a:lnTo>
-                  <a:pt x="928330" y="0"/>
-                </a:lnTo>
-                <a:lnTo>
-                  <a:pt x="928330" y="464165"/>
-                </a:lnTo>
-                <a:lnTo>
-                  <a:pt x="0" y="464165"/>
-                </a:lnTo>
-                <a:lnTo>
-                  <a:pt x="0" y="0"/>
-                </a:lnTo>
-                <a:close/>
-              </a:path>
-            </a:pathLst>
-          </a:custGeom>
-          <a:noFill/>
-          <a:ln w="19050">
-            <a:solidFill>
-              <a:srgbClr val="00B050"/>
-            </a:solidFill>
-          </a:ln>
-        </p:spPr>
-        <p:style>
-          <a:lnRef idx="2">
-            <a:scrgbClr r="0" g="0" b="0"/>
-          </a:lnRef>
-          <a:fillRef idx="1">
-            <a:scrgbClr r="0" g="0" b="0"/>
-          </a:fillRef>
-          <a:effectRef idx="0">
-            <a:schemeClr val="accent1">
-              <a:hueOff val="0"/>
-              <a:satOff val="0"/>
-              <a:lumOff val="0"/>
-              <a:alphaOff val="0"/>
-            </a:schemeClr>
-          </a:effectRef>
-          <a:fontRef idx="minor">
-            <a:schemeClr val="lt1"/>
-          </a:fontRef>
-        </p:style>
-        <p:txBody>
-          <a:bodyPr spcFirstLastPara="0" vert="horz" wrap="square" lIns="7620" tIns="7620" rIns="7620" bIns="7620" numCol="1" spcCol="1270" anchor="ctr" anchorCtr="0">
-            <a:noAutofit/>
-          </a:bodyPr>
-          <a:lstStyle/>
-          <a:p>
-            <a:pPr lvl="0" algn="ctr" defTabSz="533400">
-              <a:lnSpc>
-                <a:spcPct val="90000"/>
-              </a:lnSpc>
-              <a:spcBef>
-                <a:spcPct val="0"/>
-              </a:spcBef>
-              <a:spcAft>
-                <a:spcPts val="0"/>
-              </a:spcAft>
-            </a:pPr>
-            <a:r>
-              <a:rPr lang="en-US" sz="1100" kern="1200" dirty="0" smtClean="0">
-                <a:solidFill>
-                  <a:schemeClr val="tx1"/>
-                </a:solidFill>
-              </a:rPr>
-              <a:t>Add sequence context and transcript info</a:t>
-            </a:r>
-            <a:endParaRPr lang="en-US" sz="1100" kern="1200" dirty="0">
-              <a:solidFill>
-                <a:schemeClr val="tx1"/>
               </a:solidFill>
             </a:endParaRPr>
           </a:p>
@@ -8656,39 +7605,6 @@
       </p:sp>
       <p:cxnSp>
         <p:nvCxnSpPr>
-          <p:cNvPr id="91" name="Straight Arrow Connector 90"/>
-          <p:cNvCxnSpPr/>
-          <p:nvPr/>
-        </p:nvCxnSpPr>
-        <p:spPr>
-          <a:xfrm flipH="1">
-            <a:off x="3826353" y="2625466"/>
-            <a:ext cx="683494" cy="0"/>
-          </a:xfrm>
-          <a:prstGeom prst="straightConnector1">
-            <a:avLst/>
-          </a:prstGeom>
-          <a:ln w="12700">
-            <a:tailEnd type="triangle"/>
-          </a:ln>
-        </p:spPr>
-        <p:style>
-          <a:lnRef idx="1">
-            <a:schemeClr val="accent1"/>
-          </a:lnRef>
-          <a:fillRef idx="0">
-            <a:schemeClr val="accent1"/>
-          </a:fillRef>
-          <a:effectRef idx="0">
-            <a:schemeClr val="accent1"/>
-          </a:effectRef>
-          <a:fontRef idx="minor">
-            <a:schemeClr val="tx1"/>
-          </a:fontRef>
-        </p:style>
-      </p:cxnSp>
-      <p:cxnSp>
-        <p:nvCxnSpPr>
           <p:cNvPr id="93" name="Straight Arrow Connector 92"/>
           <p:cNvCxnSpPr/>
           <p:nvPr/>
@@ -8836,11 +7752,6 @@
               </a:rPr>
               <a:t>Add sequence context and transcript info</a:t>
             </a:r>
-            <a:endParaRPr lang="en-US" sz="1100" dirty="0">
-              <a:solidFill>
-                <a:schemeClr val="tx1"/>
-              </a:solidFill>
-            </a:endParaRPr>
           </a:p>
         </p:txBody>
       </p:sp>
@@ -8883,8 +7794,8 @@
         </p:nvCxnSpPr>
         <p:spPr>
           <a:xfrm flipH="1">
-            <a:off x="3394355" y="2274739"/>
-            <a:ext cx="3375809" cy="124507"/>
+            <a:off x="3857834" y="2274739"/>
+            <a:ext cx="2912331" cy="348321"/>
           </a:xfrm>
           <a:prstGeom prst="straightConnector1">
             <a:avLst/>
@@ -9572,7 +8483,7 @@
         <p:spPr>
           <a:xfrm>
             <a:off x="10098781" y="1994042"/>
-            <a:ext cx="1928447" cy="3344888"/>
+            <a:ext cx="1928447" cy="1757000"/>
           </a:xfrm>
           <a:prstGeom prst="ellipse">
             <a:avLst/>
@@ -9612,8 +8523,8 @@
         </p:nvSpPr>
         <p:spPr>
           <a:xfrm>
-            <a:off x="8106507" y="4274707"/>
-            <a:ext cx="1500556" cy="1580968"/>
+            <a:off x="8376438" y="4227986"/>
+            <a:ext cx="1197252" cy="1580968"/>
           </a:xfrm>
           <a:prstGeom prst="ellipse">
             <a:avLst/>
@@ -9653,8 +8564,8 @@
         </p:nvSpPr>
         <p:spPr>
           <a:xfrm>
-            <a:off x="6916614" y="4378308"/>
-            <a:ext cx="1500556" cy="2239367"/>
+            <a:off x="6916614" y="5539796"/>
+            <a:ext cx="1500556" cy="1077879"/>
           </a:xfrm>
           <a:prstGeom prst="ellipse">
             <a:avLst/>
@@ -9795,7 +8706,7 @@
         </p:nvSpPr>
         <p:spPr>
           <a:xfrm>
-            <a:off x="10620749" y="3699222"/>
+            <a:off x="10360445" y="2811520"/>
             <a:ext cx="561372" cy="369332"/>
           </a:xfrm>
           <a:prstGeom prst="rect">
@@ -9825,7 +8736,7 @@
         </p:nvSpPr>
         <p:spPr>
           <a:xfrm>
-            <a:off x="3896057" y="3270840"/>
+            <a:off x="3795940" y="3117328"/>
             <a:ext cx="928330" cy="464165"/>
           </a:xfrm>
           <a:custGeom>
@@ -9885,7 +8796,7 @@
           <a:noFill/>
           <a:ln w="19050">
             <a:solidFill>
-              <a:srgbClr val="00B050"/>
+              <a:schemeClr val="accent1"/>
             </a:solidFill>
           </a:ln>
         </p:spPr>
@@ -10149,7 +9060,7 @@
           <a:noFill/>
           <a:ln w="19050">
             <a:solidFill>
-              <a:srgbClr val="00B050"/>
+              <a:schemeClr val="accent1"/>
             </a:solidFill>
           </a:ln>
         </p:spPr>
@@ -10855,6 +9766,220 @@
           </a:p>
         </p:txBody>
       </p:sp>
+      <p:cxnSp>
+        <p:nvCxnSpPr>
+          <p:cNvPr id="9" name="Straight Connector 8"/>
+          <p:cNvCxnSpPr/>
+          <p:nvPr/>
+        </p:nvCxnSpPr>
+        <p:spPr>
+          <a:xfrm>
+            <a:off x="7588853" y="4184882"/>
+            <a:ext cx="26697" cy="186884"/>
+          </a:xfrm>
+          <a:prstGeom prst="line">
+            <a:avLst/>
+          </a:prstGeom>
+          <a:ln w="12700"/>
+        </p:spPr>
+        <p:style>
+          <a:lnRef idx="1">
+            <a:schemeClr val="accent1"/>
+          </a:lnRef>
+          <a:fillRef idx="0">
+            <a:schemeClr val="accent1"/>
+          </a:fillRef>
+          <a:effectRef idx="0">
+            <a:schemeClr val="accent1"/>
+          </a:effectRef>
+          <a:fontRef idx="minor">
+            <a:schemeClr val="tx1"/>
+          </a:fontRef>
+        </p:style>
+      </p:cxnSp>
+      <p:cxnSp>
+        <p:nvCxnSpPr>
+          <p:cNvPr id="115" name="Straight Connector 114"/>
+          <p:cNvCxnSpPr/>
+          <p:nvPr/>
+        </p:nvCxnSpPr>
+        <p:spPr>
+          <a:xfrm>
+            <a:off x="5458590" y="4183769"/>
+            <a:ext cx="33373" cy="113466"/>
+          </a:xfrm>
+          <a:prstGeom prst="line">
+            <a:avLst/>
+          </a:prstGeom>
+        </p:spPr>
+        <p:style>
+          <a:lnRef idx="1">
+            <a:schemeClr val="accent1"/>
+          </a:lnRef>
+          <a:fillRef idx="0">
+            <a:schemeClr val="accent1"/>
+          </a:fillRef>
+          <a:effectRef idx="0">
+            <a:schemeClr val="accent1"/>
+          </a:effectRef>
+          <a:fontRef idx="minor">
+            <a:schemeClr val="tx1"/>
+          </a:fontRef>
+        </p:style>
+      </p:cxnSp>
+      <p:cxnSp>
+        <p:nvCxnSpPr>
+          <p:cNvPr id="120" name="Straight Connector 119"/>
+          <p:cNvCxnSpPr/>
+          <p:nvPr/>
+        </p:nvCxnSpPr>
+        <p:spPr>
+          <a:xfrm>
+            <a:off x="4323932" y="4197118"/>
+            <a:ext cx="33373" cy="113466"/>
+          </a:xfrm>
+          <a:prstGeom prst="line">
+            <a:avLst/>
+          </a:prstGeom>
+        </p:spPr>
+        <p:style>
+          <a:lnRef idx="1">
+            <a:schemeClr val="accent1"/>
+          </a:lnRef>
+          <a:fillRef idx="0">
+            <a:schemeClr val="accent1"/>
+          </a:fillRef>
+          <a:effectRef idx="0">
+            <a:schemeClr val="accent1"/>
+          </a:effectRef>
+          <a:fontRef idx="minor">
+            <a:schemeClr val="tx1"/>
+          </a:fontRef>
+        </p:style>
+      </p:cxnSp>
+      <p:cxnSp>
+        <p:nvCxnSpPr>
+          <p:cNvPr id="128" name="Straight Connector 127"/>
+          <p:cNvCxnSpPr/>
+          <p:nvPr/>
+        </p:nvCxnSpPr>
+        <p:spPr>
+          <a:xfrm>
+            <a:off x="3201512" y="4196006"/>
+            <a:ext cx="33373" cy="113466"/>
+          </a:xfrm>
+          <a:prstGeom prst="line">
+            <a:avLst/>
+          </a:prstGeom>
+        </p:spPr>
+        <p:style>
+          <a:lnRef idx="1">
+            <a:schemeClr val="accent1"/>
+          </a:lnRef>
+          <a:fillRef idx="0">
+            <a:schemeClr val="accent1"/>
+          </a:fillRef>
+          <a:effectRef idx="0">
+            <a:schemeClr val="accent1"/>
+          </a:effectRef>
+          <a:fontRef idx="minor">
+            <a:schemeClr val="tx1"/>
+          </a:fontRef>
+        </p:style>
+      </p:cxnSp>
+      <p:cxnSp>
+        <p:nvCxnSpPr>
+          <p:cNvPr id="129" name="Straight Connector 128"/>
+          <p:cNvCxnSpPr/>
+          <p:nvPr/>
+        </p:nvCxnSpPr>
+        <p:spPr>
+          <a:xfrm>
+            <a:off x="2105790" y="4208242"/>
+            <a:ext cx="33373" cy="113466"/>
+          </a:xfrm>
+          <a:prstGeom prst="line">
+            <a:avLst/>
+          </a:prstGeom>
+          <a:ln w="12700"/>
+        </p:spPr>
+        <p:style>
+          <a:lnRef idx="1">
+            <a:schemeClr val="accent1"/>
+          </a:lnRef>
+          <a:fillRef idx="0">
+            <a:schemeClr val="accent1"/>
+          </a:fillRef>
+          <a:effectRef idx="0">
+            <a:schemeClr val="accent1"/>
+          </a:effectRef>
+          <a:fontRef idx="minor">
+            <a:schemeClr val="tx1"/>
+          </a:fontRef>
+        </p:style>
+      </p:cxnSp>
+      <p:cxnSp>
+        <p:nvCxnSpPr>
+          <p:cNvPr id="130" name="Straight Connector 129"/>
+          <p:cNvCxnSpPr/>
+          <p:nvPr/>
+        </p:nvCxnSpPr>
+        <p:spPr>
+          <a:xfrm flipV="1">
+            <a:off x="881028" y="4184883"/>
+            <a:ext cx="40047" cy="186883"/>
+          </a:xfrm>
+          <a:prstGeom prst="line">
+            <a:avLst/>
+          </a:prstGeom>
+          <a:ln w="12700"/>
+        </p:spPr>
+        <p:style>
+          <a:lnRef idx="1">
+            <a:schemeClr val="accent1"/>
+          </a:lnRef>
+          <a:fillRef idx="0">
+            <a:schemeClr val="accent1"/>
+          </a:fillRef>
+          <a:effectRef idx="0">
+            <a:schemeClr val="accent1"/>
+          </a:effectRef>
+          <a:fontRef idx="minor">
+            <a:schemeClr val="tx1"/>
+          </a:fontRef>
+        </p:style>
+      </p:cxnSp>
+      <p:cxnSp>
+        <p:nvCxnSpPr>
+          <p:cNvPr id="131" name="Straight Connector 130"/>
+          <p:cNvCxnSpPr/>
+          <p:nvPr/>
+        </p:nvCxnSpPr>
+        <p:spPr>
+          <a:xfrm>
+            <a:off x="6513154" y="4123702"/>
+            <a:ext cx="26697" cy="186884"/>
+          </a:xfrm>
+          <a:prstGeom prst="line">
+            <a:avLst/>
+          </a:prstGeom>
+          <a:ln w="12700"/>
+        </p:spPr>
+        <p:style>
+          <a:lnRef idx="1">
+            <a:schemeClr val="accent1"/>
+          </a:lnRef>
+          <a:fillRef idx="0">
+            <a:schemeClr val="accent1"/>
+          </a:fillRef>
+          <a:effectRef idx="0">
+            <a:schemeClr val="accent1"/>
+          </a:effectRef>
+          <a:fontRef idx="minor">
+            <a:schemeClr val="tx1"/>
+          </a:fontRef>
+        </p:style>
+      </p:cxnSp>
     </p:spTree>
   </p:cSld>
   <p:clrMapOvr>

</xml_diff>

<commit_message>
updated slide 2 of the powerpoint
</commit_message>
<xml_diff>
--- a/data-raw/package_functionalities.pptx
+++ b/data-raw/package_functionalities.pptx
@@ -10056,53 +10056,16 @@
           <a:lstStyle/>
           <a:p>
             <a:r>
-              <a:rPr lang="en-US" dirty="0" smtClean="0"/>
-              <a:t>Regression tests for read/write catalog 144 and 136 (</a:t>
-            </a:r>
-            <a:r>
-              <a:rPr lang="en-US" dirty="0" err="1" smtClean="0"/>
-              <a:t>JNH</a:t>
-            </a:r>
-            <a:r>
-              <a:rPr lang="en-US" smtClean="0"/>
-              <a:t>)</a:t>
-            </a:r>
-          </a:p>
-          <a:p>
-            <a:r>
-              <a:rPr lang="en-US" dirty="0" smtClean="0"/>
-              <a:t>Use </a:t>
-            </a:r>
-            <a:r>
-              <a:rPr lang="en-US" dirty="0" err="1"/>
-              <a:t>GFF</a:t>
-            </a:r>
-            <a:r>
-              <a:rPr lang="en-US" dirty="0"/>
-              <a:t> files</a:t>
-            </a:r>
-            <a:r>
-              <a:rPr lang="en-US" dirty="0" smtClean="0"/>
-              <a:t>; 2 </a:t>
-            </a:r>
-            <a:r>
-              <a:rPr lang="en-US" dirty="0"/>
-              <a:t>functions to read in; ensemble or </a:t>
-            </a:r>
-            <a:r>
-              <a:rPr lang="en-US" dirty="0" err="1" smtClean="0"/>
-              <a:t>gencode</a:t>
-            </a:r>
-            <a:endParaRPr lang="en-US" dirty="0" smtClean="0"/>
-          </a:p>
-          <a:p>
-            <a:r>
               <a:rPr lang="en-US" dirty="0" err="1" smtClean="0"/>
               <a:t>Fn</a:t>
             </a:r>
             <a:r>
               <a:rPr lang="en-US" dirty="0" smtClean="0"/>
-              <a:t> to write  _our_ annotated </a:t>
+              <a:t> </a:t>
+            </a:r>
+            <a:r>
+              <a:rPr lang="en-US" dirty="0" smtClean="0"/>
+              <a:t>to write  _our_ annotated </a:t>
             </a:r>
             <a:r>
               <a:rPr lang="en-US" dirty="0" err="1" smtClean="0"/>
@@ -10134,27 +10097,6 @@
               <a:rPr lang="en-US" dirty="0" smtClean="0"/>
               <a:t>tests</a:t>
             </a:r>
-          </a:p>
-          <a:p>
-            <a:r>
-              <a:rPr lang="en-US" dirty="0" smtClean="0"/>
-              <a:t>Build package</a:t>
-            </a:r>
-          </a:p>
-          <a:p>
-            <a:r>
-              <a:rPr lang="en-US" dirty="0" smtClean="0"/>
-              <a:t>Define which </a:t>
-            </a:r>
-            <a:r>
-              <a:rPr lang="en-US" dirty="0" err="1" smtClean="0"/>
-              <a:t>fns</a:t>
-            </a:r>
-            <a:r>
-              <a:rPr lang="en-US" dirty="0" smtClean="0"/>
-              <a:t> are visible</a:t>
-            </a:r>
-            <a:endParaRPr lang="en-US" dirty="0"/>
           </a:p>
           <a:p>
             <a:endParaRPr lang="en-US" dirty="0"/>

</xml_diff>

<commit_message>
Some updates to documentation and associated update to data-raw/.gitignore
</commit_message>
<xml_diff>
--- a/data-raw/package_functionalities.pptx
+++ b/data-raw/package_functionalities.pptx
@@ -244,7 +244,7 @@
           <a:p>
             <a:fld id="{FC92A4BB-39BE-403C-A496-EAAF42256EA7}" type="datetimeFigureOut">
               <a:rPr lang="en-SG" smtClean="0"/>
-              <a:t>18/1/2019</a:t>
+              <a:t>23/1/2019</a:t>
             </a:fld>
             <a:endParaRPr lang="en-SG"/>
           </a:p>
@@ -409,7 +409,7 @@
           <a:p>
             <a:fld id="{FC92A4BB-39BE-403C-A496-EAAF42256EA7}" type="datetimeFigureOut">
               <a:rPr lang="en-SG" smtClean="0"/>
-              <a:t>18/1/2019</a:t>
+              <a:t>23/1/2019</a:t>
             </a:fld>
             <a:endParaRPr lang="en-SG"/>
           </a:p>
@@ -584,7 +584,7 @@
           <a:p>
             <a:fld id="{FC92A4BB-39BE-403C-A496-EAAF42256EA7}" type="datetimeFigureOut">
               <a:rPr lang="en-SG" smtClean="0"/>
-              <a:t>18/1/2019</a:t>
+              <a:t>23/1/2019</a:t>
             </a:fld>
             <a:endParaRPr lang="en-SG"/>
           </a:p>
@@ -749,7 +749,7 @@
           <a:p>
             <a:fld id="{FC92A4BB-39BE-403C-A496-EAAF42256EA7}" type="datetimeFigureOut">
               <a:rPr lang="en-SG" smtClean="0"/>
-              <a:t>18/1/2019</a:t>
+              <a:t>23/1/2019</a:t>
             </a:fld>
             <a:endParaRPr lang="en-SG"/>
           </a:p>
@@ -990,7 +990,7 @@
           <a:p>
             <a:fld id="{FC92A4BB-39BE-403C-A496-EAAF42256EA7}" type="datetimeFigureOut">
               <a:rPr lang="en-SG" smtClean="0"/>
-              <a:t>18/1/2019</a:t>
+              <a:t>23/1/2019</a:t>
             </a:fld>
             <a:endParaRPr lang="en-SG"/>
           </a:p>
@@ -1217,7 +1217,7 @@
           <a:p>
             <a:fld id="{FC92A4BB-39BE-403C-A496-EAAF42256EA7}" type="datetimeFigureOut">
               <a:rPr lang="en-SG" smtClean="0"/>
-              <a:t>18/1/2019</a:t>
+              <a:t>23/1/2019</a:t>
             </a:fld>
             <a:endParaRPr lang="en-SG"/>
           </a:p>
@@ -1579,7 +1579,7 @@
           <a:p>
             <a:fld id="{FC92A4BB-39BE-403C-A496-EAAF42256EA7}" type="datetimeFigureOut">
               <a:rPr lang="en-SG" smtClean="0"/>
-              <a:t>18/1/2019</a:t>
+              <a:t>23/1/2019</a:t>
             </a:fld>
             <a:endParaRPr lang="en-SG"/>
           </a:p>
@@ -1692,7 +1692,7 @@
           <a:p>
             <a:fld id="{FC92A4BB-39BE-403C-A496-EAAF42256EA7}" type="datetimeFigureOut">
               <a:rPr lang="en-SG" smtClean="0"/>
-              <a:t>18/1/2019</a:t>
+              <a:t>23/1/2019</a:t>
             </a:fld>
             <a:endParaRPr lang="en-SG"/>
           </a:p>
@@ -1782,7 +1782,7 @@
           <a:p>
             <a:fld id="{FC92A4BB-39BE-403C-A496-EAAF42256EA7}" type="datetimeFigureOut">
               <a:rPr lang="en-SG" smtClean="0"/>
-              <a:t>18/1/2019</a:t>
+              <a:t>23/1/2019</a:t>
             </a:fld>
             <a:endParaRPr lang="en-SG"/>
           </a:p>
@@ -2054,7 +2054,7 @@
           <a:p>
             <a:fld id="{FC92A4BB-39BE-403C-A496-EAAF42256EA7}" type="datetimeFigureOut">
               <a:rPr lang="en-SG" smtClean="0"/>
-              <a:t>18/1/2019</a:t>
+              <a:t>23/1/2019</a:t>
             </a:fld>
             <a:endParaRPr lang="en-SG"/>
           </a:p>
@@ -2302,7 +2302,7 @@
           <a:p>
             <a:fld id="{FC92A4BB-39BE-403C-A496-EAAF42256EA7}" type="datetimeFigureOut">
               <a:rPr lang="en-SG" smtClean="0"/>
-              <a:t>18/1/2019</a:t>
+              <a:t>23/1/2019</a:t>
             </a:fld>
             <a:endParaRPr lang="en-SG"/>
           </a:p>
@@ -2510,7 +2510,7 @@
           <a:p>
             <a:fld id="{FC92A4BB-39BE-403C-A496-EAAF42256EA7}" type="datetimeFigureOut">
               <a:rPr lang="en-SG" smtClean="0"/>
-              <a:t>18/1/2019</a:t>
+              <a:t>23/1/2019</a:t>
             </a:fld>
             <a:endParaRPr lang="en-SG"/>
           </a:p>
@@ -3322,8 +3322,21 @@
                   <a:schemeClr val="tx1"/>
                 </a:solidFill>
               </a:rPr>
-              <a:t>: Strelka, GATK</a:t>
-            </a:r>
+              <a:t>: Strelka, </a:t>
+            </a:r>
+            <a:r>
+              <a:rPr lang="en-US" sz="1100" dirty="0" err="1" smtClean="0">
+                <a:solidFill>
+                  <a:schemeClr val="tx1"/>
+                </a:solidFill>
+              </a:rPr>
+              <a:t>mutect</a:t>
+            </a:r>
+            <a:endParaRPr lang="en-US" sz="1100" kern="1200" dirty="0" smtClean="0">
+              <a:solidFill>
+                <a:schemeClr val="tx1"/>
+              </a:solidFill>
+            </a:endParaRPr>
           </a:p>
         </p:txBody>
       </p:sp>
@@ -4784,7 +4797,7 @@
         </p:nvSpPr>
         <p:spPr>
           <a:xfrm>
-            <a:off x="3782180" y="4832694"/>
+            <a:off x="3772990" y="4832694"/>
             <a:ext cx="928330" cy="464165"/>
           </a:xfrm>
           <a:custGeom>
@@ -5050,7 +5063,7 @@
         </p:nvSpPr>
         <p:spPr>
           <a:xfrm>
-            <a:off x="5008491" y="5494693"/>
+            <a:off x="5040656" y="5356844"/>
             <a:ext cx="928330" cy="464165"/>
           </a:xfrm>
           <a:custGeom>
@@ -7157,8 +7170,8 @@
         </p:nvSpPr>
         <p:spPr>
           <a:xfrm>
-            <a:off x="8706250" y="1204408"/>
-            <a:ext cx="1694487" cy="464165"/>
+            <a:off x="8706251" y="1204408"/>
+            <a:ext cx="915626" cy="831166"/>
           </a:xfrm>
           <a:custGeom>
             <a:avLst/>
@@ -7331,8 +7344,8 @@
         </p:nvSpPr>
         <p:spPr>
           <a:xfrm>
-            <a:off x="9350016" y="3137548"/>
-            <a:ext cx="1116808" cy="464165"/>
+            <a:off x="9713019" y="3151333"/>
+            <a:ext cx="1116808" cy="929005"/>
           </a:xfrm>
           <a:custGeom>
             <a:avLst/>
@@ -8232,7 +8245,7 @@
         </p:nvSpPr>
         <p:spPr>
           <a:xfrm>
-            <a:off x="10828621" y="3137405"/>
+            <a:off x="10998635" y="3137405"/>
             <a:ext cx="928330" cy="464165"/>
           </a:xfrm>
           <a:custGeom>
@@ -8394,13 +8407,13 @@
       </p:sp>
       <p:sp>
         <p:nvSpPr>
-          <p:cNvPr id="117" name="Oval 116"/>
+          <p:cNvPr id="118" name="Oval 117"/>
           <p:cNvSpPr/>
           <p:nvPr/>
         </p:nvSpPr>
         <p:spPr>
           <a:xfrm>
-            <a:off x="3516923" y="5709138"/>
+            <a:off x="3353242" y="4915945"/>
             <a:ext cx="3235570" cy="967154"/>
           </a:xfrm>
           <a:prstGeom prst="ellipse">
@@ -8435,14 +8448,14 @@
       </p:sp>
       <p:sp>
         <p:nvSpPr>
-          <p:cNvPr id="118" name="Oval 117"/>
+          <p:cNvPr id="122" name="Oval 121"/>
           <p:cNvSpPr/>
           <p:nvPr/>
         </p:nvSpPr>
         <p:spPr>
           <a:xfrm>
-            <a:off x="3546231" y="4824046"/>
-            <a:ext cx="3235570" cy="967154"/>
+            <a:off x="8376438" y="4227986"/>
+            <a:ext cx="1197252" cy="1580968"/>
           </a:xfrm>
           <a:prstGeom prst="ellipse">
             <a:avLst/>
@@ -8476,14 +8489,14 @@
       </p:sp>
       <p:sp>
         <p:nvSpPr>
-          <p:cNvPr id="121" name="Oval 120"/>
+          <p:cNvPr id="123" name="Oval 122"/>
           <p:cNvSpPr/>
           <p:nvPr/>
         </p:nvSpPr>
         <p:spPr>
           <a:xfrm>
-            <a:off x="10098781" y="1994042"/>
-            <a:ext cx="1928447" cy="1757000"/>
+            <a:off x="6820119" y="5126248"/>
+            <a:ext cx="1500556" cy="1077879"/>
           </a:xfrm>
           <a:prstGeom prst="ellipse">
             <a:avLst/>
@@ -8517,14 +8530,14 @@
       </p:sp>
       <p:sp>
         <p:nvSpPr>
-          <p:cNvPr id="122" name="Oval 121"/>
+          <p:cNvPr id="124" name="Oval 123"/>
           <p:cNvSpPr/>
           <p:nvPr/>
         </p:nvSpPr>
         <p:spPr>
           <a:xfrm>
-            <a:off x="8376438" y="4227986"/>
-            <a:ext cx="1197252" cy="1580968"/>
+            <a:off x="357553" y="263769"/>
+            <a:ext cx="779585" cy="369277"/>
           </a:xfrm>
           <a:prstGeom prst="ellipse">
             <a:avLst/>
@@ -8558,88 +8571,6 @@
       </p:sp>
       <p:sp>
         <p:nvSpPr>
-          <p:cNvPr id="123" name="Oval 122"/>
-          <p:cNvSpPr/>
-          <p:nvPr/>
-        </p:nvSpPr>
-        <p:spPr>
-          <a:xfrm>
-            <a:off x="6916614" y="5539796"/>
-            <a:ext cx="1500556" cy="1077879"/>
-          </a:xfrm>
-          <a:prstGeom prst="ellipse">
-            <a:avLst/>
-          </a:prstGeom>
-          <a:noFill/>
-        </p:spPr>
-        <p:style>
-          <a:lnRef idx="2">
-            <a:schemeClr val="accent1">
-              <a:shade val="50000"/>
-            </a:schemeClr>
-          </a:lnRef>
-          <a:fillRef idx="1">
-            <a:schemeClr val="accent1"/>
-          </a:fillRef>
-          <a:effectRef idx="0">
-            <a:schemeClr val="accent1"/>
-          </a:effectRef>
-          <a:fontRef idx="minor">
-            <a:schemeClr val="lt1"/>
-          </a:fontRef>
-        </p:style>
-        <p:txBody>
-          <a:bodyPr rtlCol="0" anchor="ctr"/>
-          <a:lstStyle/>
-          <a:p>
-            <a:pPr algn="ctr"/>
-            <a:endParaRPr lang="en-US"/>
-          </a:p>
-        </p:txBody>
-      </p:sp>
-      <p:sp>
-        <p:nvSpPr>
-          <p:cNvPr id="124" name="Oval 123"/>
-          <p:cNvSpPr/>
-          <p:nvPr/>
-        </p:nvSpPr>
-        <p:spPr>
-          <a:xfrm>
-            <a:off x="357553" y="263769"/>
-            <a:ext cx="779585" cy="369277"/>
-          </a:xfrm>
-          <a:prstGeom prst="ellipse">
-            <a:avLst/>
-          </a:prstGeom>
-          <a:noFill/>
-        </p:spPr>
-        <p:style>
-          <a:lnRef idx="2">
-            <a:schemeClr val="accent1">
-              <a:shade val="50000"/>
-            </a:schemeClr>
-          </a:lnRef>
-          <a:fillRef idx="1">
-            <a:schemeClr val="accent1"/>
-          </a:fillRef>
-          <a:effectRef idx="0">
-            <a:schemeClr val="accent1"/>
-          </a:effectRef>
-          <a:fontRef idx="minor">
-            <a:schemeClr val="lt1"/>
-          </a:fontRef>
-        </p:style>
-        <p:txBody>
-          <a:bodyPr rtlCol="0" anchor="ctr"/>
-          <a:lstStyle/>
-          <a:p>
-            <a:pPr algn="ctr"/>
-            <a:endParaRPr lang="en-US"/>
-          </a:p>
-        </p:txBody>
-      </p:sp>
-      <p:sp>
-        <p:nvSpPr>
           <p:cNvPr id="125" name="TextBox 124"/>
           <p:cNvSpPr txBox="1"/>
           <p:nvPr/>
@@ -8706,7 +8637,7 @@
         </p:nvSpPr>
         <p:spPr>
           <a:xfrm>
-            <a:off x="10360445" y="2811520"/>
+            <a:off x="9703364" y="128055"/>
             <a:ext cx="561372" cy="369332"/>
           </a:xfrm>
           <a:prstGeom prst="rect">
@@ -9368,7 +9299,7 @@
         </p:nvSpPr>
         <p:spPr>
           <a:xfrm>
-            <a:off x="6985625" y="1467695"/>
+            <a:off x="7008600" y="1453910"/>
             <a:ext cx="513282" cy="261610"/>
           </a:xfrm>
           <a:prstGeom prst="rect">
@@ -9440,7 +9371,7 @@
         <p:spPr>
           <a:xfrm>
             <a:off x="7576457" y="698187"/>
-            <a:ext cx="2657715" cy="369332"/>
+            <a:ext cx="2835135" cy="369332"/>
           </a:xfrm>
           <a:prstGeom prst="rect">
             <a:avLst/>
@@ -9471,7 +9402,15 @@
             </a:r>
             <a:r>
               <a:rPr lang="en-US" dirty="0" smtClean="0"/>
-              <a:t> for GATK?)</a:t>
+              <a:t> for </a:t>
+            </a:r>
+            <a:r>
+              <a:rPr lang="en-US" dirty="0" err="1" smtClean="0"/>
+              <a:t>mutect</a:t>
+            </a:r>
+            <a:r>
+              <a:rPr lang="en-US" dirty="0" smtClean="0"/>
+              <a:t>?)</a:t>
             </a:r>
             <a:endParaRPr lang="en-US" dirty="0"/>
           </a:p>
@@ -9485,7 +9424,7 @@
         </p:nvSpPr>
         <p:spPr>
           <a:xfrm>
-            <a:off x="10826822" y="3775727"/>
+            <a:off x="10955482" y="3619498"/>
             <a:ext cx="928330" cy="464165"/>
           </a:xfrm>
           <a:custGeom>
@@ -9650,7 +9589,7 @@
         </p:nvSpPr>
         <p:spPr>
           <a:xfrm>
-            <a:off x="9508830" y="3872987"/>
+            <a:off x="9789124" y="4107331"/>
             <a:ext cx="928330" cy="464165"/>
           </a:xfrm>
           <a:custGeom>
@@ -9964,6 +9903,89 @@
             <a:avLst/>
           </a:prstGeom>
           <a:ln w="12700"/>
+        </p:spPr>
+        <p:style>
+          <a:lnRef idx="1">
+            <a:schemeClr val="accent1"/>
+          </a:lnRef>
+          <a:fillRef idx="0">
+            <a:schemeClr val="accent1"/>
+          </a:fillRef>
+          <a:effectRef idx="0">
+            <a:schemeClr val="accent1"/>
+          </a:effectRef>
+          <a:fontRef idx="minor">
+            <a:schemeClr val="tx1"/>
+          </a:fontRef>
+        </p:style>
+      </p:cxnSp>
+      <p:sp>
+        <p:nvSpPr>
+          <p:cNvPr id="8" name="TextBox 7"/>
+          <p:cNvSpPr txBox="1"/>
+          <p:nvPr/>
+        </p:nvSpPr>
+        <p:spPr>
+          <a:xfrm flipH="1">
+            <a:off x="-326243" y="716816"/>
+            <a:ext cx="3221077" cy="769441"/>
+          </a:xfrm>
+          <a:prstGeom prst="rect">
+            <a:avLst/>
+          </a:prstGeom>
+          <a:noFill/>
+        </p:spPr>
+        <p:txBody>
+          <a:bodyPr wrap="square" rtlCol="0">
+            <a:spAutoFit/>
+          </a:bodyPr>
+          <a:lstStyle/>
+          <a:p>
+            <a:r>
+              <a:rPr lang="en-US" sz="1100" dirty="0" smtClean="0"/>
+              <a:t>Extra </a:t>
+            </a:r>
+            <a:r>
+              <a:rPr lang="en-US" sz="1100" dirty="0" err="1" smtClean="0"/>
+              <a:t>fns</a:t>
+            </a:r>
+            <a:r>
+              <a:rPr lang="en-US" sz="1100" dirty="0" smtClean="0"/>
+              <a:t>:</a:t>
+            </a:r>
+          </a:p>
+          <a:p>
+            <a:r>
+              <a:rPr lang="en-US" sz="1100" dirty="0" smtClean="0"/>
+              <a:t>Opportunity normalize (any opportunity to another)</a:t>
+            </a:r>
+          </a:p>
+          <a:p>
+            <a:r>
+              <a:rPr lang="en-US" sz="1100" dirty="0" smtClean="0"/>
+              <a:t>Calculate opportunities (abundances) for a genome; optional bed file of regions to leave out</a:t>
+            </a:r>
+            <a:endParaRPr lang="en-US" sz="1100" dirty="0"/>
+          </a:p>
+        </p:txBody>
+      </p:sp>
+      <p:cxnSp>
+        <p:nvCxnSpPr>
+          <p:cNvPr id="11" name="Straight Connector 10"/>
+          <p:cNvCxnSpPr/>
+          <p:nvPr/>
+        </p:nvCxnSpPr>
+        <p:spPr>
+          <a:xfrm>
+            <a:off x="9654042" y="64330"/>
+            <a:ext cx="0" cy="5886162"/>
+          </a:xfrm>
+          <a:prstGeom prst="line">
+            <a:avLst/>
+          </a:prstGeom>
+          <a:ln w="19050">
+            <a:prstDash val="sysDash"/>
+          </a:ln>
         </p:spPr>
         <p:style>
           <a:lnRef idx="1">
@@ -10061,11 +10083,7 @@
             </a:r>
             <a:r>
               <a:rPr lang="en-US" dirty="0" smtClean="0"/>
-              <a:t> </a:t>
-            </a:r>
-            <a:r>
-              <a:rPr lang="en-US" dirty="0" smtClean="0"/>
-              <a:t>to write  _our_ annotated </a:t>
+              <a:t> to write  _our_ annotated </a:t>
             </a:r>
             <a:r>
               <a:rPr lang="en-US" dirty="0" err="1" smtClean="0"/>

</xml_diff>

<commit_message>
Working on functions to process Mutect VCFs
</commit_message>
<xml_diff>
--- a/data-raw/package_functionalities.pptx
+++ b/data-raw/package_functionalities.pptx
@@ -6,7 +6,8 @@
   </p:sldMasterIdLst>
   <p:sldIdLst>
     <p:sldId id="256" r:id="rId2"/>
-    <p:sldId id="257" r:id="rId3"/>
+    <p:sldId id="258" r:id="rId3"/>
+    <p:sldId id="257" r:id="rId4"/>
   </p:sldIdLst>
   <p:sldSz cx="12192000" cy="6858000"/>
   <p:notesSz cx="6797675" cy="9926638"/>
@@ -244,7 +245,7 @@
           <a:p>
             <a:fld id="{FC92A4BB-39BE-403C-A496-EAAF42256EA7}" type="datetimeFigureOut">
               <a:rPr lang="en-SG" smtClean="0"/>
-              <a:t>23/1/2019</a:t>
+              <a:t>26/1/2019</a:t>
             </a:fld>
             <a:endParaRPr lang="en-SG"/>
           </a:p>
@@ -409,7 +410,7 @@
           <a:p>
             <a:fld id="{FC92A4BB-39BE-403C-A496-EAAF42256EA7}" type="datetimeFigureOut">
               <a:rPr lang="en-SG" smtClean="0"/>
-              <a:t>23/1/2019</a:t>
+              <a:t>26/1/2019</a:t>
             </a:fld>
             <a:endParaRPr lang="en-SG"/>
           </a:p>
@@ -584,7 +585,7 @@
           <a:p>
             <a:fld id="{FC92A4BB-39BE-403C-A496-EAAF42256EA7}" type="datetimeFigureOut">
               <a:rPr lang="en-SG" smtClean="0"/>
-              <a:t>23/1/2019</a:t>
+              <a:t>26/1/2019</a:t>
             </a:fld>
             <a:endParaRPr lang="en-SG"/>
           </a:p>
@@ -749,7 +750,7 @@
           <a:p>
             <a:fld id="{FC92A4BB-39BE-403C-A496-EAAF42256EA7}" type="datetimeFigureOut">
               <a:rPr lang="en-SG" smtClean="0"/>
-              <a:t>23/1/2019</a:t>
+              <a:t>26/1/2019</a:t>
             </a:fld>
             <a:endParaRPr lang="en-SG"/>
           </a:p>
@@ -990,7 +991,7 @@
           <a:p>
             <a:fld id="{FC92A4BB-39BE-403C-A496-EAAF42256EA7}" type="datetimeFigureOut">
               <a:rPr lang="en-SG" smtClean="0"/>
-              <a:t>23/1/2019</a:t>
+              <a:t>26/1/2019</a:t>
             </a:fld>
             <a:endParaRPr lang="en-SG"/>
           </a:p>
@@ -1217,7 +1218,7 @@
           <a:p>
             <a:fld id="{FC92A4BB-39BE-403C-A496-EAAF42256EA7}" type="datetimeFigureOut">
               <a:rPr lang="en-SG" smtClean="0"/>
-              <a:t>23/1/2019</a:t>
+              <a:t>26/1/2019</a:t>
             </a:fld>
             <a:endParaRPr lang="en-SG"/>
           </a:p>
@@ -1579,7 +1580,7 @@
           <a:p>
             <a:fld id="{FC92A4BB-39BE-403C-A496-EAAF42256EA7}" type="datetimeFigureOut">
               <a:rPr lang="en-SG" smtClean="0"/>
-              <a:t>23/1/2019</a:t>
+              <a:t>26/1/2019</a:t>
             </a:fld>
             <a:endParaRPr lang="en-SG"/>
           </a:p>
@@ -1692,7 +1693,7 @@
           <a:p>
             <a:fld id="{FC92A4BB-39BE-403C-A496-EAAF42256EA7}" type="datetimeFigureOut">
               <a:rPr lang="en-SG" smtClean="0"/>
-              <a:t>23/1/2019</a:t>
+              <a:t>26/1/2019</a:t>
             </a:fld>
             <a:endParaRPr lang="en-SG"/>
           </a:p>
@@ -1782,7 +1783,7 @@
           <a:p>
             <a:fld id="{FC92A4BB-39BE-403C-A496-EAAF42256EA7}" type="datetimeFigureOut">
               <a:rPr lang="en-SG" smtClean="0"/>
-              <a:t>23/1/2019</a:t>
+              <a:t>26/1/2019</a:t>
             </a:fld>
             <a:endParaRPr lang="en-SG"/>
           </a:p>
@@ -2054,7 +2055,7 @@
           <a:p>
             <a:fld id="{FC92A4BB-39BE-403C-A496-EAAF42256EA7}" type="datetimeFigureOut">
               <a:rPr lang="en-SG" smtClean="0"/>
-              <a:t>23/1/2019</a:t>
+              <a:t>26/1/2019</a:t>
             </a:fld>
             <a:endParaRPr lang="en-SG"/>
           </a:p>
@@ -2302,7 +2303,7 @@
           <a:p>
             <a:fld id="{FC92A4BB-39BE-403C-A496-EAAF42256EA7}" type="datetimeFigureOut">
               <a:rPr lang="en-SG" smtClean="0"/>
-              <a:t>23/1/2019</a:t>
+              <a:t>26/1/2019</a:t>
             </a:fld>
             <a:endParaRPr lang="en-SG"/>
           </a:p>
@@ -2510,7 +2511,7 @@
           <a:p>
             <a:fld id="{FC92A4BB-39BE-403C-A496-EAAF42256EA7}" type="datetimeFigureOut">
               <a:rPr lang="en-SG" smtClean="0"/>
-              <a:t>23/1/2019</a:t>
+              <a:t>26/1/2019</a:t>
             </a:fld>
             <a:endParaRPr lang="en-SG"/>
           </a:p>
@@ -3309,28 +3310,28 @@
               <a:t>Read </a:t>
             </a:r>
             <a:r>
+              <a:rPr lang="en-US" sz="1100" dirty="0" smtClean="0">
+                <a:solidFill>
+                  <a:schemeClr val="tx1"/>
+                </a:solidFill>
+              </a:rPr>
+              <a:t>S</a:t>
+            </a:r>
+            <a:r>
+              <a:rPr lang="en-US" sz="1100" kern="1200" dirty="0" smtClean="0">
+                <a:solidFill>
+                  <a:schemeClr val="tx1"/>
+                </a:solidFill>
+              </a:rPr>
+              <a:t>trelka SBS </a:t>
+            </a:r>
+            <a:r>
               <a:rPr lang="en-US" sz="1100" kern="1200" dirty="0" err="1" smtClean="0">
                 <a:solidFill>
                   <a:schemeClr val="tx1"/>
                 </a:solidFill>
               </a:rPr>
               <a:t>VCF</a:t>
-            </a:r>
-            <a:r>
-              <a:rPr lang="en-US" sz="1100" kern="1200" dirty="0" smtClean="0">
-                <a:solidFill>
-                  <a:schemeClr val="tx1"/>
-                </a:solidFill>
-              </a:rPr>
-              <a:t>: Strelka, </a:t>
-            </a:r>
-            <a:r>
-              <a:rPr lang="en-US" sz="1100" dirty="0" err="1" smtClean="0">
-                <a:solidFill>
-                  <a:schemeClr val="tx1"/>
-                </a:solidFill>
-              </a:rPr>
-              <a:t>mutect</a:t>
             </a:r>
             <a:endParaRPr lang="en-US" sz="1100" kern="1200" dirty="0" smtClean="0">
               <a:solidFill>
@@ -3473,12 +3474,12 @@
               <a:t>S </a:t>
             </a:r>
             <a:r>
-              <a:rPr lang="en-US" sz="1100" kern="1200" dirty="0" err="1" smtClean="0">
+              <a:rPr lang="en-US" sz="1100" kern="1200" smtClean="0">
                 <a:solidFill>
                   <a:schemeClr val="tx1"/>
                 </a:solidFill>
               </a:rPr>
-              <a:t>vcf</a:t>
+              <a:t>VCF </a:t>
             </a:r>
             <a:endParaRPr lang="en-US" sz="1100" kern="1200" dirty="0">
               <a:solidFill>
@@ -5718,7 +5719,7 @@
                   <a:schemeClr val="tx1"/>
                 </a:solidFill>
               </a:rPr>
-              <a:t>vcf</a:t>
+              <a:t>VCF</a:t>
             </a:r>
             <a:endParaRPr lang="en-US" sz="1100" dirty="0" smtClean="0">
               <a:solidFill>
@@ -7657,7 +7658,7 @@
         </p:nvSpPr>
         <p:spPr>
           <a:xfrm>
-            <a:off x="10481138" y="2255234"/>
+            <a:off x="10490327" y="1212174"/>
             <a:ext cx="1456607" cy="566541"/>
           </a:xfrm>
           <a:custGeom>
@@ -7763,8 +7764,21 @@
                   <a:schemeClr val="tx1"/>
                 </a:solidFill>
               </a:rPr>
-              <a:t>Add sequence context and transcript info</a:t>
-            </a:r>
+              <a:t>Add sequence context and transcript </a:t>
+            </a:r>
+            <a:r>
+              <a:rPr lang="en-US" sz="1100" dirty="0" smtClean="0">
+                <a:solidFill>
+                  <a:schemeClr val="tx1"/>
+                </a:solidFill>
+              </a:rPr>
+              <a:t>info</a:t>
+            </a:r>
+            <a:endParaRPr lang="en-US" sz="1100" dirty="0">
+              <a:solidFill>
+                <a:schemeClr val="tx1"/>
+              </a:solidFill>
+            </a:endParaRPr>
           </a:p>
         </p:txBody>
       </p:sp>
@@ -7877,7 +7891,7 @@
         <p:spPr>
           <a:xfrm>
             <a:off x="11080906" y="761249"/>
-            <a:ext cx="3038" cy="1491913"/>
+            <a:ext cx="15958" cy="438039"/>
           </a:xfrm>
           <a:prstGeom prst="straightConnector1">
             <a:avLst/>
@@ -8015,8 +8029,21 @@
                   <a:schemeClr val="tx1"/>
                 </a:solidFill>
               </a:rPr>
-              <a:t>Read ID</a:t>
-            </a:r>
+              <a:t>Read </a:t>
+            </a:r>
+            <a:r>
+              <a:rPr lang="en-US" sz="1100" dirty="0" smtClean="0">
+                <a:solidFill>
+                  <a:schemeClr val="tx1"/>
+                </a:solidFill>
+              </a:rPr>
+              <a:t>Strelka ID</a:t>
+            </a:r>
+            <a:endParaRPr lang="en-US" sz="1100" dirty="0" smtClean="0">
+              <a:solidFill>
+                <a:schemeClr val="tx1"/>
+              </a:solidFill>
+            </a:endParaRPr>
           </a:p>
           <a:p>
             <a:pPr lvl="0" algn="ctr" defTabSz="533400">
@@ -9548,8 +9575,8 @@
         </p:nvSpPr>
         <p:spPr>
           <a:xfrm>
-            <a:off x="10458163" y="59414"/>
-            <a:ext cx="1500676" cy="2828784"/>
+            <a:off x="10448973" y="0"/>
+            <a:ext cx="1500676" cy="2826230"/>
           </a:xfrm>
           <a:prstGeom prst="rect">
             <a:avLst/>
@@ -10002,6 +10029,138 @@
           </a:fontRef>
         </p:style>
       </p:cxnSp>
+      <p:sp>
+        <p:nvSpPr>
+          <p:cNvPr id="90" name="Freeform 89"/>
+          <p:cNvSpPr/>
+          <p:nvPr/>
+        </p:nvSpPr>
+        <p:spPr>
+          <a:xfrm>
+            <a:off x="10537043" y="2076795"/>
+            <a:ext cx="1456607" cy="566541"/>
+          </a:xfrm>
+          <a:custGeom>
+            <a:avLst/>
+            <a:gdLst>
+              <a:gd name="connsiteX0" fmla="*/ 0 w 928330"/>
+              <a:gd name="connsiteY0" fmla="*/ 0 h 464165"/>
+              <a:gd name="connsiteX1" fmla="*/ 928330 w 928330"/>
+              <a:gd name="connsiteY1" fmla="*/ 0 h 464165"/>
+              <a:gd name="connsiteX2" fmla="*/ 928330 w 928330"/>
+              <a:gd name="connsiteY2" fmla="*/ 464165 h 464165"/>
+              <a:gd name="connsiteX3" fmla="*/ 0 w 928330"/>
+              <a:gd name="connsiteY3" fmla="*/ 464165 h 464165"/>
+              <a:gd name="connsiteX4" fmla="*/ 0 w 928330"/>
+              <a:gd name="connsiteY4" fmla="*/ 0 h 464165"/>
+            </a:gdLst>
+            <a:ahLst/>
+            <a:cxnLst>
+              <a:cxn ang="0">
+                <a:pos x="connsiteX0" y="connsiteY0"/>
+              </a:cxn>
+              <a:cxn ang="0">
+                <a:pos x="connsiteX1" y="connsiteY1"/>
+              </a:cxn>
+              <a:cxn ang="0">
+                <a:pos x="connsiteX2" y="connsiteY2"/>
+              </a:cxn>
+              <a:cxn ang="0">
+                <a:pos x="connsiteX3" y="connsiteY3"/>
+              </a:cxn>
+              <a:cxn ang="0">
+                <a:pos x="connsiteX4" y="connsiteY4"/>
+              </a:cxn>
+            </a:cxnLst>
+            <a:rect l="l" t="t" r="r" b="b"/>
+            <a:pathLst>
+              <a:path w="928330" h="464165">
+                <a:moveTo>
+                  <a:pt x="0" y="0"/>
+                </a:moveTo>
+                <a:lnTo>
+                  <a:pt x="928330" y="0"/>
+                </a:lnTo>
+                <a:lnTo>
+                  <a:pt x="928330" y="464165"/>
+                </a:lnTo>
+                <a:lnTo>
+                  <a:pt x="0" y="464165"/>
+                </a:lnTo>
+                <a:lnTo>
+                  <a:pt x="0" y="0"/>
+                </a:lnTo>
+                <a:close/>
+              </a:path>
+            </a:pathLst>
+          </a:custGeom>
+          <a:noFill/>
+          <a:ln w="19050">
+            <a:solidFill>
+              <a:schemeClr val="accent1"/>
+            </a:solidFill>
+          </a:ln>
+        </p:spPr>
+        <p:style>
+          <a:lnRef idx="2">
+            <a:scrgbClr r="0" g="0" b="0"/>
+          </a:lnRef>
+          <a:fillRef idx="1">
+            <a:scrgbClr r="0" g="0" b="0"/>
+          </a:fillRef>
+          <a:effectRef idx="0">
+            <a:schemeClr val="accent1">
+              <a:hueOff val="0"/>
+              <a:satOff val="0"/>
+              <a:lumOff val="0"/>
+              <a:alphaOff val="0"/>
+            </a:schemeClr>
+          </a:effectRef>
+          <a:fontRef idx="minor">
+            <a:schemeClr val="lt1"/>
+          </a:fontRef>
+        </p:style>
+        <p:txBody>
+          <a:bodyPr spcFirstLastPara="0" vert="horz" wrap="square" lIns="7620" tIns="7620" rIns="7620" bIns="7620" numCol="1" spcCol="1270" anchor="ctr" anchorCtr="0">
+            <a:noAutofit/>
+          </a:bodyPr>
+          <a:lstStyle/>
+          <a:p>
+            <a:pPr lvl="0" algn="ctr" defTabSz="533400">
+              <a:lnSpc>
+                <a:spcPct val="90000"/>
+              </a:lnSpc>
+              <a:spcBef>
+                <a:spcPct val="0"/>
+              </a:spcBef>
+              <a:spcAft>
+                <a:spcPts val="0"/>
+              </a:spcAft>
+            </a:pPr>
+            <a:r>
+              <a:rPr lang="en-US" sz="1100" dirty="0" smtClean="0">
+                <a:solidFill>
+                  <a:schemeClr val="tx1"/>
+                </a:solidFill>
+              </a:rPr>
+              <a:t>Annotated ID </a:t>
+            </a:r>
+            <a:r>
+              <a:rPr lang="en-US" sz="1100" dirty="0" err="1" smtClean="0">
+                <a:solidFill>
+                  <a:schemeClr val="tx1"/>
+                </a:solidFill>
+              </a:rPr>
+              <a:t>VCF</a:t>
+            </a:r>
+            <a:endParaRPr lang="en-US" sz="1100" dirty="0">
+              <a:solidFill>
+                <a:schemeClr val="tx1"/>
+              </a:solidFill>
+            </a:endParaRPr>
+          </a:p>
+        </p:txBody>
+      </p:sp>
     </p:spTree>
   </p:cSld>
   <p:clrMapOvr>
@@ -10018,6 +10177,70 @@
 </file>
 
 <file path=ppt/slides/slide2.xml><?xml version="1.0" encoding="utf-8"?>
+<p:sld xmlns:a="http://schemas.openxmlformats.org/drawingml/2006/main" xmlns:r="http://schemas.openxmlformats.org/officeDocument/2006/relationships" xmlns:p="http://schemas.openxmlformats.org/presentationml/2006/main">
+  <p:cSld>
+    <p:spTree>
+      <p:nvGrpSpPr>
+        <p:cNvPr id="1" name=""/>
+        <p:cNvGrpSpPr/>
+        <p:nvPr/>
+      </p:nvGrpSpPr>
+      <p:grpSpPr>
+        <a:xfrm>
+          <a:off x="0" y="0"/>
+          <a:ext cx="0" cy="0"/>
+          <a:chOff x="0" y="0"/>
+          <a:chExt cx="0" cy="0"/>
+        </a:xfrm>
+      </p:grpSpPr>
+      <p:sp>
+        <p:nvSpPr>
+          <p:cNvPr id="4" name="TextBox 3"/>
+          <p:cNvSpPr txBox="1"/>
+          <p:nvPr/>
+        </p:nvSpPr>
+        <p:spPr>
+          <a:xfrm>
+            <a:off x="4680107" y="743232"/>
+            <a:ext cx="1801519" cy="369332"/>
+          </a:xfrm>
+          <a:prstGeom prst="rect">
+            <a:avLst/>
+          </a:prstGeom>
+          <a:noFill/>
+        </p:spPr>
+        <p:txBody>
+          <a:bodyPr wrap="none" rtlCol="0">
+            <a:spAutoFit/>
+          </a:bodyPr>
+          <a:lstStyle/>
+          <a:p>
+            <a:r>
+              <a:rPr lang="en-US" dirty="0" smtClean="0"/>
+              <a:t>Read Mutect </a:t>
+            </a:r>
+            <a:r>
+              <a:rPr lang="en-US" dirty="0" err="1" smtClean="0"/>
+              <a:t>VCF</a:t>
+            </a:r>
+            <a:endParaRPr lang="en-US" dirty="0"/>
+          </a:p>
+        </p:txBody>
+      </p:sp>
+    </p:spTree>
+    <p:extLst>
+      <p:ext uri="{BB962C8B-B14F-4D97-AF65-F5344CB8AC3E}">
+        <p14:creationId xmlns:p14="http://schemas.microsoft.com/office/powerpoint/2010/main" val="851600733"/>
+      </p:ext>
+    </p:extLst>
+  </p:cSld>
+  <p:clrMapOvr>
+    <a:masterClrMapping/>
+  </p:clrMapOvr>
+</p:sld>
+</file>
+
+<file path=ppt/slides/slide3.xml><?xml version="1.0" encoding="utf-8"?>
 <p:sld xmlns:a="http://schemas.openxmlformats.org/drawingml/2006/main" xmlns:r="http://schemas.openxmlformats.org/officeDocument/2006/relationships" xmlns:p="http://schemas.openxmlformats.org/presentationml/2006/main">
   <p:cSld>
     <p:spTree>

</xml_diff>

<commit_message>
started to update powerpoint to accommodate Mutect vcfs
</commit_message>
<xml_diff>
--- a/data-raw/package_functionalities.pptx
+++ b/data-raw/package_functionalities.pptx
@@ -3474,12 +3474,20 @@
               <a:t>S </a:t>
             </a:r>
             <a:r>
-              <a:rPr lang="en-US" sz="1100" kern="1200" smtClean="0">
+              <a:rPr lang="en-US" sz="1100" kern="1200" dirty="0" err="1" smtClean="0">
                 <a:solidFill>
                   <a:schemeClr val="tx1"/>
                 </a:solidFill>
               </a:rPr>
-              <a:t>VCF </a:t>
+              <a:t>VCF</a:t>
+            </a:r>
+            <a:r>
+              <a:rPr lang="en-US" sz="1100" kern="1200" dirty="0" smtClean="0">
+                <a:solidFill>
+                  <a:schemeClr val="tx1"/>
+                </a:solidFill>
+              </a:rPr>
+              <a:t> </a:t>
             </a:r>
             <a:endParaRPr lang="en-US" sz="1100" kern="1200" dirty="0">
               <a:solidFill>

</xml_diff>

<commit_message>
New to-do item -- need man entries for user vesible global data
</commit_message>
<xml_diff>
--- a/data-raw/package_functionalities.pptx
+++ b/data-raw/package_functionalities.pptx
@@ -245,7 +245,7 @@
           <a:p>
             <a:fld id="{FC92A4BB-39BE-403C-A496-EAAF42256EA7}" type="datetimeFigureOut">
               <a:rPr lang="en-SG" smtClean="0"/>
-              <a:t>26/1/2019</a:t>
+              <a:t>28/1/2019</a:t>
             </a:fld>
             <a:endParaRPr lang="en-SG"/>
           </a:p>
@@ -410,7 +410,7 @@
           <a:p>
             <a:fld id="{FC92A4BB-39BE-403C-A496-EAAF42256EA7}" type="datetimeFigureOut">
               <a:rPr lang="en-SG" smtClean="0"/>
-              <a:t>26/1/2019</a:t>
+              <a:t>28/1/2019</a:t>
             </a:fld>
             <a:endParaRPr lang="en-SG"/>
           </a:p>
@@ -585,7 +585,7 @@
           <a:p>
             <a:fld id="{FC92A4BB-39BE-403C-A496-EAAF42256EA7}" type="datetimeFigureOut">
               <a:rPr lang="en-SG" smtClean="0"/>
-              <a:t>26/1/2019</a:t>
+              <a:t>28/1/2019</a:t>
             </a:fld>
             <a:endParaRPr lang="en-SG"/>
           </a:p>
@@ -750,7 +750,7 @@
           <a:p>
             <a:fld id="{FC92A4BB-39BE-403C-A496-EAAF42256EA7}" type="datetimeFigureOut">
               <a:rPr lang="en-SG" smtClean="0"/>
-              <a:t>26/1/2019</a:t>
+              <a:t>28/1/2019</a:t>
             </a:fld>
             <a:endParaRPr lang="en-SG"/>
           </a:p>
@@ -991,7 +991,7 @@
           <a:p>
             <a:fld id="{FC92A4BB-39BE-403C-A496-EAAF42256EA7}" type="datetimeFigureOut">
               <a:rPr lang="en-SG" smtClean="0"/>
-              <a:t>26/1/2019</a:t>
+              <a:t>28/1/2019</a:t>
             </a:fld>
             <a:endParaRPr lang="en-SG"/>
           </a:p>
@@ -1218,7 +1218,7 @@
           <a:p>
             <a:fld id="{FC92A4BB-39BE-403C-A496-EAAF42256EA7}" type="datetimeFigureOut">
               <a:rPr lang="en-SG" smtClean="0"/>
-              <a:t>26/1/2019</a:t>
+              <a:t>28/1/2019</a:t>
             </a:fld>
             <a:endParaRPr lang="en-SG"/>
           </a:p>
@@ -1580,7 +1580,7 @@
           <a:p>
             <a:fld id="{FC92A4BB-39BE-403C-A496-EAAF42256EA7}" type="datetimeFigureOut">
               <a:rPr lang="en-SG" smtClean="0"/>
-              <a:t>26/1/2019</a:t>
+              <a:t>28/1/2019</a:t>
             </a:fld>
             <a:endParaRPr lang="en-SG"/>
           </a:p>
@@ -1693,7 +1693,7 @@
           <a:p>
             <a:fld id="{FC92A4BB-39BE-403C-A496-EAAF42256EA7}" type="datetimeFigureOut">
               <a:rPr lang="en-SG" smtClean="0"/>
-              <a:t>26/1/2019</a:t>
+              <a:t>28/1/2019</a:t>
             </a:fld>
             <a:endParaRPr lang="en-SG"/>
           </a:p>
@@ -1783,7 +1783,7 @@
           <a:p>
             <a:fld id="{FC92A4BB-39BE-403C-A496-EAAF42256EA7}" type="datetimeFigureOut">
               <a:rPr lang="en-SG" smtClean="0"/>
-              <a:t>26/1/2019</a:t>
+              <a:t>28/1/2019</a:t>
             </a:fld>
             <a:endParaRPr lang="en-SG"/>
           </a:p>
@@ -2055,7 +2055,7 @@
           <a:p>
             <a:fld id="{FC92A4BB-39BE-403C-A496-EAAF42256EA7}" type="datetimeFigureOut">
               <a:rPr lang="en-SG" smtClean="0"/>
-              <a:t>26/1/2019</a:t>
+              <a:t>28/1/2019</a:t>
             </a:fld>
             <a:endParaRPr lang="en-SG"/>
           </a:p>
@@ -2303,7 +2303,7 @@
           <a:p>
             <a:fld id="{FC92A4BB-39BE-403C-A496-EAAF42256EA7}" type="datetimeFigureOut">
               <a:rPr lang="en-SG" smtClean="0"/>
-              <a:t>26/1/2019</a:t>
+              <a:t>28/1/2019</a:t>
             </a:fld>
             <a:endParaRPr lang="en-SG"/>
           </a:p>
@@ -2511,7 +2511,7 @@
           <a:p>
             <a:fld id="{FC92A4BB-39BE-403C-A496-EAAF42256EA7}" type="datetimeFigureOut">
               <a:rPr lang="en-SG" smtClean="0"/>
-              <a:t>26/1/2019</a:t>
+              <a:t>28/1/2019</a:t>
             </a:fld>
             <a:endParaRPr lang="en-SG"/>
           </a:p>
@@ -8037,21 +8037,8 @@
                   <a:schemeClr val="tx1"/>
                 </a:solidFill>
               </a:rPr>
-              <a:t>Read </a:t>
-            </a:r>
-            <a:r>
-              <a:rPr lang="en-US" sz="1100" dirty="0" smtClean="0">
-                <a:solidFill>
-                  <a:schemeClr val="tx1"/>
-                </a:solidFill>
-              </a:rPr>
-              <a:t>Strelka ID</a:t>
-            </a:r>
-            <a:endParaRPr lang="en-US" sz="1100" dirty="0" smtClean="0">
-              <a:solidFill>
-                <a:schemeClr val="tx1"/>
-              </a:solidFill>
-            </a:endParaRPr>
+              <a:t>Read Strelka ID</a:t>
+            </a:r>
           </a:p>
           <a:p>
             <a:pPr lvl="0" algn="ctr" defTabSz="533400">
@@ -10344,8 +10331,24 @@
             </a:r>
             <a:r>
               <a:rPr lang="en-US" dirty="0" smtClean="0"/>
-              <a:t>tests</a:t>
-            </a:r>
+              <a:t>tests (Done, correct?)</a:t>
+            </a:r>
+          </a:p>
+          <a:p>
+            <a:r>
+              <a:rPr lang="en-US" dirty="0" smtClean="0"/>
+              <a:t>Add documentation for </a:t>
+            </a:r>
+            <a:r>
+              <a:rPr lang="en-US" smtClean="0"/>
+              <a:t>user-visible global data</a:t>
+            </a:r>
+          </a:p>
+          <a:p>
+            <a:pPr marL="0" indent="0">
+              <a:buNone/>
+            </a:pPr>
+            <a:endParaRPr lang="en-US" dirty="0" smtClean="0"/>
           </a:p>
           <a:p>
             <a:endParaRPr lang="en-US" dirty="0"/>

</xml_diff>